<commit_message>
Adding updated files for the experiments related to topological shortcuts
</commit_message>
<xml_diff>
--- a/Images/SI10.pptx
+++ b/Images/SI10.pptx
@@ -2,12 +2,12 @@
 <file path=ppt/presentation.xml><?xml version="1.0" encoding="utf-8"?>
 <p:presentation xmlns:a="http://schemas.openxmlformats.org/drawingml/2006/main" xmlns:r="http://schemas.openxmlformats.org/officeDocument/2006/relationships" xmlns:p="http://schemas.openxmlformats.org/presentationml/2006/main" saveSubsetFonts="1">
   <p:sldMasterIdLst>
-    <p:sldMasterId id="2147483720" r:id="rId1"/>
+    <p:sldMasterId id="2147483732" r:id="rId1"/>
   </p:sldMasterIdLst>
   <p:sldIdLst>
     <p:sldId id="256" r:id="rId2"/>
   </p:sldIdLst>
-  <p:sldSz cx="16459200" cy="15544800"/>
+  <p:sldSz cx="18288000" cy="15544800"/>
   <p:notesSz cx="6858000" cy="9144000"/>
   <p:defaultTextStyle>
     <a:defPPr>
@@ -141,15 +141,15 @@
         </p:nvSpPr>
         <p:spPr>
           <a:xfrm>
-            <a:off x="1234440" y="2544023"/>
-            <a:ext cx="13990320" cy="5411893"/>
+            <a:off x="1371600" y="2544023"/>
+            <a:ext cx="15544800" cy="5411893"/>
           </a:xfrm>
         </p:spPr>
         <p:txBody>
           <a:bodyPr anchor="b"/>
           <a:lstStyle>
             <a:lvl1pPr algn="ctr">
-              <a:defRPr sz="10800"/>
+              <a:defRPr sz="12000"/>
             </a:lvl1pPr>
           </a:lstStyle>
           <a:p>
@@ -173,8 +173,8 @@
         </p:nvSpPr>
         <p:spPr>
           <a:xfrm>
-            <a:off x="2057400" y="8164619"/>
-            <a:ext cx="12344400" cy="3753061"/>
+            <a:off x="2286000" y="8164619"/>
+            <a:ext cx="13716000" cy="3753061"/>
           </a:xfrm>
         </p:spPr>
         <p:txBody>
@@ -182,39 +182,39 @@
           <a:lstStyle>
             <a:lvl1pPr marL="0" indent="0" algn="ctr">
               <a:buNone/>
-              <a:defRPr sz="4320"/>
+              <a:defRPr sz="4800"/>
             </a:lvl1pPr>
-            <a:lvl2pPr marL="822960" indent="0" algn="ctr">
+            <a:lvl2pPr marL="914400" indent="0" algn="ctr">
+              <a:buNone/>
+              <a:defRPr sz="4000"/>
+            </a:lvl2pPr>
+            <a:lvl3pPr marL="1828800" indent="0" algn="ctr">
               <a:buNone/>
               <a:defRPr sz="3600"/>
-            </a:lvl2pPr>
-            <a:lvl3pPr marL="1645920" indent="0" algn="ctr">
-              <a:buNone/>
-              <a:defRPr sz="3240"/>
             </a:lvl3pPr>
-            <a:lvl4pPr marL="2468880" indent="0" algn="ctr">
-              <a:buNone/>
-              <a:defRPr sz="2880"/>
+            <a:lvl4pPr marL="2743200" indent="0" algn="ctr">
+              <a:buNone/>
+              <a:defRPr sz="3200"/>
             </a:lvl4pPr>
-            <a:lvl5pPr marL="3291840" indent="0" algn="ctr">
-              <a:buNone/>
-              <a:defRPr sz="2880"/>
+            <a:lvl5pPr marL="3657600" indent="0" algn="ctr">
+              <a:buNone/>
+              <a:defRPr sz="3200"/>
             </a:lvl5pPr>
-            <a:lvl6pPr marL="4114800" indent="0" algn="ctr">
-              <a:buNone/>
-              <a:defRPr sz="2880"/>
+            <a:lvl6pPr marL="4572000" indent="0" algn="ctr">
+              <a:buNone/>
+              <a:defRPr sz="3200"/>
             </a:lvl6pPr>
-            <a:lvl7pPr marL="4937760" indent="0" algn="ctr">
-              <a:buNone/>
-              <a:defRPr sz="2880"/>
+            <a:lvl7pPr marL="5486400" indent="0" algn="ctr">
+              <a:buNone/>
+              <a:defRPr sz="3200"/>
             </a:lvl7pPr>
-            <a:lvl8pPr marL="5760720" indent="0" algn="ctr">
-              <a:buNone/>
-              <a:defRPr sz="2880"/>
+            <a:lvl8pPr marL="6400800" indent="0" algn="ctr">
+              <a:buNone/>
+              <a:defRPr sz="3200"/>
             </a:lvl8pPr>
-            <a:lvl9pPr marL="6583680" indent="0" algn="ctr">
-              <a:buNone/>
-              <a:defRPr sz="2880"/>
+            <a:lvl9pPr marL="7315200" indent="0" algn="ctr">
+              <a:buNone/>
+              <a:defRPr sz="3200"/>
             </a:lvl9pPr>
           </a:lstStyle>
           <a:p>
@@ -243,7 +243,7 @@
           <a:p>
             <a:fld id="{DAF893F0-10B0-447B-BEF1-194A0B612EFC}" type="datetimeFigureOut">
               <a:rPr lang="en-US" smtClean="0"/>
-              <a:t>10/27/2021</a:t>
+              <a:t>10/28/2021</a:t>
             </a:fld>
             <a:endParaRPr lang="en-US"/>
           </a:p>
@@ -294,7 +294,7 @@
     </p:spTree>
     <p:extLst>
       <p:ext uri="{BB962C8B-B14F-4D97-AF65-F5344CB8AC3E}">
-        <p14:creationId xmlns:p14="http://schemas.microsoft.com/office/powerpoint/2010/main" val="665517850"/>
+        <p14:creationId xmlns:p14="http://schemas.microsoft.com/office/powerpoint/2010/main" val="1696833654"/>
       </p:ext>
     </p:extLst>
   </p:cSld>
@@ -413,7 +413,7 @@
           <a:p>
             <a:fld id="{DAF893F0-10B0-447B-BEF1-194A0B612EFC}" type="datetimeFigureOut">
               <a:rPr lang="en-US" smtClean="0"/>
-              <a:t>10/27/2021</a:t>
+              <a:t>10/28/2021</a:t>
             </a:fld>
             <a:endParaRPr lang="en-US"/>
           </a:p>
@@ -464,7 +464,7 @@
     </p:spTree>
     <p:extLst>
       <p:ext uri="{BB962C8B-B14F-4D97-AF65-F5344CB8AC3E}">
-        <p14:creationId xmlns:p14="http://schemas.microsoft.com/office/powerpoint/2010/main" val="2435207380"/>
+        <p14:creationId xmlns:p14="http://schemas.microsoft.com/office/powerpoint/2010/main" val="404209479"/>
       </p:ext>
     </p:extLst>
   </p:cSld>
@@ -503,8 +503,8 @@
         </p:nvSpPr>
         <p:spPr>
           <a:xfrm>
-            <a:off x="11778616" y="827617"/>
-            <a:ext cx="3549015" cy="13173499"/>
+            <a:off x="13087351" y="827617"/>
+            <a:ext cx="3943350" cy="13173499"/>
           </a:xfrm>
         </p:spPr>
         <p:txBody>
@@ -531,8 +531,8 @@
         </p:nvSpPr>
         <p:spPr>
           <a:xfrm>
-            <a:off x="1131571" y="827617"/>
-            <a:ext cx="10441305" cy="13173499"/>
+            <a:off x="1257301" y="827617"/>
+            <a:ext cx="11601450" cy="13173499"/>
           </a:xfrm>
         </p:spPr>
         <p:txBody>
@@ -593,7 +593,7 @@
           <a:p>
             <a:fld id="{DAF893F0-10B0-447B-BEF1-194A0B612EFC}" type="datetimeFigureOut">
               <a:rPr lang="en-US" smtClean="0"/>
-              <a:t>10/27/2021</a:t>
+              <a:t>10/28/2021</a:t>
             </a:fld>
             <a:endParaRPr lang="en-US"/>
           </a:p>
@@ -644,7 +644,7 @@
     </p:spTree>
     <p:extLst>
       <p:ext uri="{BB962C8B-B14F-4D97-AF65-F5344CB8AC3E}">
-        <p14:creationId xmlns:p14="http://schemas.microsoft.com/office/powerpoint/2010/main" val="4119899110"/>
+        <p14:creationId xmlns:p14="http://schemas.microsoft.com/office/powerpoint/2010/main" val="2985852829"/>
       </p:ext>
     </p:extLst>
   </p:cSld>
@@ -763,7 +763,7 @@
           <a:p>
             <a:fld id="{DAF893F0-10B0-447B-BEF1-194A0B612EFC}" type="datetimeFigureOut">
               <a:rPr lang="en-US" smtClean="0"/>
-              <a:t>10/27/2021</a:t>
+              <a:t>10/28/2021</a:t>
             </a:fld>
             <a:endParaRPr lang="en-US"/>
           </a:p>
@@ -814,7 +814,7 @@
     </p:spTree>
     <p:extLst>
       <p:ext uri="{BB962C8B-B14F-4D97-AF65-F5344CB8AC3E}">
-        <p14:creationId xmlns:p14="http://schemas.microsoft.com/office/powerpoint/2010/main" val="573765683"/>
+        <p14:creationId xmlns:p14="http://schemas.microsoft.com/office/powerpoint/2010/main" val="1464100076"/>
       </p:ext>
     </p:extLst>
   </p:cSld>
@@ -853,15 +853,15 @@
         </p:nvSpPr>
         <p:spPr>
           <a:xfrm>
-            <a:off x="1122998" y="3875409"/>
-            <a:ext cx="14196060" cy="6466204"/>
+            <a:off x="1247776" y="3875409"/>
+            <a:ext cx="15773400" cy="6466204"/>
           </a:xfrm>
         </p:spPr>
         <p:txBody>
           <a:bodyPr anchor="b"/>
           <a:lstStyle>
             <a:lvl1pPr>
-              <a:defRPr sz="10800"/>
+              <a:defRPr sz="12000"/>
             </a:lvl1pPr>
           </a:lstStyle>
           <a:p>
@@ -885,8 +885,8 @@
         </p:nvSpPr>
         <p:spPr>
           <a:xfrm>
-            <a:off x="1122998" y="10402786"/>
-            <a:ext cx="14196060" cy="3400424"/>
+            <a:off x="1247776" y="10402786"/>
+            <a:ext cx="15773400" cy="3400424"/>
           </a:xfrm>
         </p:spPr>
         <p:txBody>
@@ -894,13 +894,23 @@
           <a:lstStyle>
             <a:lvl1pPr marL="0" indent="0">
               <a:buNone/>
-              <a:defRPr sz="4320">
+              <a:defRPr sz="4800">
                 <a:solidFill>
                   <a:schemeClr val="tx1"/>
                 </a:solidFill>
               </a:defRPr>
             </a:lvl1pPr>
-            <a:lvl2pPr marL="822960" indent="0">
+            <a:lvl2pPr marL="914400" indent="0">
+              <a:buNone/>
+              <a:defRPr sz="4000">
+                <a:solidFill>
+                  <a:schemeClr val="tx1">
+                    <a:tint val="75000"/>
+                  </a:schemeClr>
+                </a:solidFill>
+              </a:defRPr>
+            </a:lvl2pPr>
+            <a:lvl3pPr marL="1828800" indent="0">
               <a:buNone/>
               <a:defRPr sz="3600">
                 <a:solidFill>
@@ -909,20 +919,10 @@
                   </a:schemeClr>
                 </a:solidFill>
               </a:defRPr>
-            </a:lvl2pPr>
-            <a:lvl3pPr marL="1645920" indent="0">
-              <a:buNone/>
-              <a:defRPr sz="3240">
-                <a:solidFill>
-                  <a:schemeClr val="tx1">
-                    <a:tint val="75000"/>
-                  </a:schemeClr>
-                </a:solidFill>
-              </a:defRPr>
             </a:lvl3pPr>
-            <a:lvl4pPr marL="2468880" indent="0">
-              <a:buNone/>
-              <a:defRPr sz="2880">
+            <a:lvl4pPr marL="2743200" indent="0">
+              <a:buNone/>
+              <a:defRPr sz="3200">
                 <a:solidFill>
                   <a:schemeClr val="tx1">
                     <a:tint val="75000"/>
@@ -930,9 +930,9 @@
                 </a:solidFill>
               </a:defRPr>
             </a:lvl4pPr>
-            <a:lvl5pPr marL="3291840" indent="0">
-              <a:buNone/>
-              <a:defRPr sz="2880">
+            <a:lvl5pPr marL="3657600" indent="0">
+              <a:buNone/>
+              <a:defRPr sz="3200">
                 <a:solidFill>
                   <a:schemeClr val="tx1">
                     <a:tint val="75000"/>
@@ -940,9 +940,9 @@
                 </a:solidFill>
               </a:defRPr>
             </a:lvl5pPr>
-            <a:lvl6pPr marL="4114800" indent="0">
-              <a:buNone/>
-              <a:defRPr sz="2880">
+            <a:lvl6pPr marL="4572000" indent="0">
+              <a:buNone/>
+              <a:defRPr sz="3200">
                 <a:solidFill>
                   <a:schemeClr val="tx1">
                     <a:tint val="75000"/>
@@ -950,9 +950,9 @@
                 </a:solidFill>
               </a:defRPr>
             </a:lvl6pPr>
-            <a:lvl7pPr marL="4937760" indent="0">
-              <a:buNone/>
-              <a:defRPr sz="2880">
+            <a:lvl7pPr marL="5486400" indent="0">
+              <a:buNone/>
+              <a:defRPr sz="3200">
                 <a:solidFill>
                   <a:schemeClr val="tx1">
                     <a:tint val="75000"/>
@@ -960,9 +960,9 @@
                 </a:solidFill>
               </a:defRPr>
             </a:lvl7pPr>
-            <a:lvl8pPr marL="5760720" indent="0">
-              <a:buNone/>
-              <a:defRPr sz="2880">
+            <a:lvl8pPr marL="6400800" indent="0">
+              <a:buNone/>
+              <a:defRPr sz="3200">
                 <a:solidFill>
                   <a:schemeClr val="tx1">
                     <a:tint val="75000"/>
@@ -970,9 +970,9 @@
                 </a:solidFill>
               </a:defRPr>
             </a:lvl8pPr>
-            <a:lvl9pPr marL="6583680" indent="0">
-              <a:buNone/>
-              <a:defRPr sz="2880">
+            <a:lvl9pPr marL="7315200" indent="0">
+              <a:buNone/>
+              <a:defRPr sz="3200">
                 <a:solidFill>
                   <a:schemeClr val="tx1">
                     <a:tint val="75000"/>
@@ -1007,7 +1007,7 @@
           <a:p>
             <a:fld id="{DAF893F0-10B0-447B-BEF1-194A0B612EFC}" type="datetimeFigureOut">
               <a:rPr lang="en-US" smtClean="0"/>
-              <a:t>10/27/2021</a:t>
+              <a:t>10/28/2021</a:t>
             </a:fld>
             <a:endParaRPr lang="en-US"/>
           </a:p>
@@ -1058,7 +1058,7 @@
     </p:spTree>
     <p:extLst>
       <p:ext uri="{BB962C8B-B14F-4D97-AF65-F5344CB8AC3E}">
-        <p14:creationId xmlns:p14="http://schemas.microsoft.com/office/powerpoint/2010/main" val="3312783195"/>
+        <p14:creationId xmlns:p14="http://schemas.microsoft.com/office/powerpoint/2010/main" val="1224535182"/>
       </p:ext>
     </p:extLst>
   </p:cSld>
@@ -1120,8 +1120,8 @@
         </p:nvSpPr>
         <p:spPr>
           <a:xfrm>
-            <a:off x="1131570" y="4138083"/>
-            <a:ext cx="6995160" cy="9863033"/>
+            <a:off x="1257300" y="4138083"/>
+            <a:ext cx="7772400" cy="9863033"/>
           </a:xfrm>
         </p:spPr>
         <p:txBody>
@@ -1177,8 +1177,8 @@
         </p:nvSpPr>
         <p:spPr>
           <a:xfrm>
-            <a:off x="8332470" y="4138083"/>
-            <a:ext cx="6995160" cy="9863033"/>
+            <a:off x="9258300" y="4138083"/>
+            <a:ext cx="7772400" cy="9863033"/>
           </a:xfrm>
         </p:spPr>
         <p:txBody>
@@ -1239,7 +1239,7 @@
           <a:p>
             <a:fld id="{DAF893F0-10B0-447B-BEF1-194A0B612EFC}" type="datetimeFigureOut">
               <a:rPr lang="en-US" smtClean="0"/>
-              <a:t>10/27/2021</a:t>
+              <a:t>10/28/2021</a:t>
             </a:fld>
             <a:endParaRPr lang="en-US"/>
           </a:p>
@@ -1290,7 +1290,7 @@
     </p:spTree>
     <p:extLst>
       <p:ext uri="{BB962C8B-B14F-4D97-AF65-F5344CB8AC3E}">
-        <p14:creationId xmlns:p14="http://schemas.microsoft.com/office/powerpoint/2010/main" val="266575699"/>
+        <p14:creationId xmlns:p14="http://schemas.microsoft.com/office/powerpoint/2010/main" val="124161468"/>
       </p:ext>
     </p:extLst>
   </p:cSld>
@@ -1329,8 +1329,8 @@
         </p:nvSpPr>
         <p:spPr>
           <a:xfrm>
-            <a:off x="1133714" y="827620"/>
-            <a:ext cx="14196060" cy="3004609"/>
+            <a:off x="1259682" y="827620"/>
+            <a:ext cx="15773400" cy="3004609"/>
           </a:xfrm>
         </p:spPr>
         <p:txBody>
@@ -1357,8 +1357,8 @@
         </p:nvSpPr>
         <p:spPr>
           <a:xfrm>
-            <a:off x="1133716" y="3810636"/>
-            <a:ext cx="6963012" cy="1867534"/>
+            <a:off x="1259684" y="3810636"/>
+            <a:ext cx="7736680" cy="1867534"/>
           </a:xfrm>
         </p:spPr>
         <p:txBody>
@@ -1366,39 +1366,39 @@
           <a:lstStyle>
             <a:lvl1pPr marL="0" indent="0">
               <a:buNone/>
-              <a:defRPr sz="4320" b="1"/>
+              <a:defRPr sz="4800" b="1"/>
             </a:lvl1pPr>
-            <a:lvl2pPr marL="822960" indent="0">
+            <a:lvl2pPr marL="914400" indent="0">
+              <a:buNone/>
+              <a:defRPr sz="4000" b="1"/>
+            </a:lvl2pPr>
+            <a:lvl3pPr marL="1828800" indent="0">
               <a:buNone/>
               <a:defRPr sz="3600" b="1"/>
-            </a:lvl2pPr>
-            <a:lvl3pPr marL="1645920" indent="0">
-              <a:buNone/>
-              <a:defRPr sz="3240" b="1"/>
             </a:lvl3pPr>
-            <a:lvl4pPr marL="2468880" indent="0">
-              <a:buNone/>
-              <a:defRPr sz="2880" b="1"/>
+            <a:lvl4pPr marL="2743200" indent="0">
+              <a:buNone/>
+              <a:defRPr sz="3200" b="1"/>
             </a:lvl4pPr>
-            <a:lvl5pPr marL="3291840" indent="0">
-              <a:buNone/>
-              <a:defRPr sz="2880" b="1"/>
+            <a:lvl5pPr marL="3657600" indent="0">
+              <a:buNone/>
+              <a:defRPr sz="3200" b="1"/>
             </a:lvl5pPr>
-            <a:lvl6pPr marL="4114800" indent="0">
-              <a:buNone/>
-              <a:defRPr sz="2880" b="1"/>
+            <a:lvl6pPr marL="4572000" indent="0">
+              <a:buNone/>
+              <a:defRPr sz="3200" b="1"/>
             </a:lvl6pPr>
-            <a:lvl7pPr marL="4937760" indent="0">
-              <a:buNone/>
-              <a:defRPr sz="2880" b="1"/>
+            <a:lvl7pPr marL="5486400" indent="0">
+              <a:buNone/>
+              <a:defRPr sz="3200" b="1"/>
             </a:lvl7pPr>
-            <a:lvl8pPr marL="5760720" indent="0">
-              <a:buNone/>
-              <a:defRPr sz="2880" b="1"/>
+            <a:lvl8pPr marL="6400800" indent="0">
+              <a:buNone/>
+              <a:defRPr sz="3200" b="1"/>
             </a:lvl8pPr>
-            <a:lvl9pPr marL="6583680" indent="0">
-              <a:buNone/>
-              <a:defRPr sz="2880" b="1"/>
+            <a:lvl9pPr marL="7315200" indent="0">
+              <a:buNone/>
+              <a:defRPr sz="3200" b="1"/>
             </a:lvl9pPr>
           </a:lstStyle>
           <a:p>
@@ -1422,8 +1422,8 @@
         </p:nvSpPr>
         <p:spPr>
           <a:xfrm>
-            <a:off x="1133716" y="5678170"/>
-            <a:ext cx="6963012" cy="8351733"/>
+            <a:off x="1259684" y="5678170"/>
+            <a:ext cx="7736680" cy="8351733"/>
           </a:xfrm>
         </p:spPr>
         <p:txBody>
@@ -1479,8 +1479,8 @@
         </p:nvSpPr>
         <p:spPr>
           <a:xfrm>
-            <a:off x="8332471" y="3810636"/>
-            <a:ext cx="6997304" cy="1867534"/>
+            <a:off x="9258301" y="3810636"/>
+            <a:ext cx="7774782" cy="1867534"/>
           </a:xfrm>
         </p:spPr>
         <p:txBody>
@@ -1488,39 +1488,39 @@
           <a:lstStyle>
             <a:lvl1pPr marL="0" indent="0">
               <a:buNone/>
-              <a:defRPr sz="4320" b="1"/>
+              <a:defRPr sz="4800" b="1"/>
             </a:lvl1pPr>
-            <a:lvl2pPr marL="822960" indent="0">
+            <a:lvl2pPr marL="914400" indent="0">
+              <a:buNone/>
+              <a:defRPr sz="4000" b="1"/>
+            </a:lvl2pPr>
+            <a:lvl3pPr marL="1828800" indent="0">
               <a:buNone/>
               <a:defRPr sz="3600" b="1"/>
-            </a:lvl2pPr>
-            <a:lvl3pPr marL="1645920" indent="0">
-              <a:buNone/>
-              <a:defRPr sz="3240" b="1"/>
             </a:lvl3pPr>
-            <a:lvl4pPr marL="2468880" indent="0">
-              <a:buNone/>
-              <a:defRPr sz="2880" b="1"/>
+            <a:lvl4pPr marL="2743200" indent="0">
+              <a:buNone/>
+              <a:defRPr sz="3200" b="1"/>
             </a:lvl4pPr>
-            <a:lvl5pPr marL="3291840" indent="0">
-              <a:buNone/>
-              <a:defRPr sz="2880" b="1"/>
+            <a:lvl5pPr marL="3657600" indent="0">
+              <a:buNone/>
+              <a:defRPr sz="3200" b="1"/>
             </a:lvl5pPr>
-            <a:lvl6pPr marL="4114800" indent="0">
-              <a:buNone/>
-              <a:defRPr sz="2880" b="1"/>
+            <a:lvl6pPr marL="4572000" indent="0">
+              <a:buNone/>
+              <a:defRPr sz="3200" b="1"/>
             </a:lvl6pPr>
-            <a:lvl7pPr marL="4937760" indent="0">
-              <a:buNone/>
-              <a:defRPr sz="2880" b="1"/>
+            <a:lvl7pPr marL="5486400" indent="0">
+              <a:buNone/>
+              <a:defRPr sz="3200" b="1"/>
             </a:lvl7pPr>
-            <a:lvl8pPr marL="5760720" indent="0">
-              <a:buNone/>
-              <a:defRPr sz="2880" b="1"/>
+            <a:lvl8pPr marL="6400800" indent="0">
+              <a:buNone/>
+              <a:defRPr sz="3200" b="1"/>
             </a:lvl8pPr>
-            <a:lvl9pPr marL="6583680" indent="0">
-              <a:buNone/>
-              <a:defRPr sz="2880" b="1"/>
+            <a:lvl9pPr marL="7315200" indent="0">
+              <a:buNone/>
+              <a:defRPr sz="3200" b="1"/>
             </a:lvl9pPr>
           </a:lstStyle>
           <a:p>
@@ -1544,8 +1544,8 @@
         </p:nvSpPr>
         <p:spPr>
           <a:xfrm>
-            <a:off x="8332471" y="5678170"/>
-            <a:ext cx="6997304" cy="8351733"/>
+            <a:off x="9258301" y="5678170"/>
+            <a:ext cx="7774782" cy="8351733"/>
           </a:xfrm>
         </p:spPr>
         <p:txBody>
@@ -1606,7 +1606,7 @@
           <a:p>
             <a:fld id="{DAF893F0-10B0-447B-BEF1-194A0B612EFC}" type="datetimeFigureOut">
               <a:rPr lang="en-US" smtClean="0"/>
-              <a:t>10/27/2021</a:t>
+              <a:t>10/28/2021</a:t>
             </a:fld>
             <a:endParaRPr lang="en-US"/>
           </a:p>
@@ -1657,7 +1657,7 @@
     </p:spTree>
     <p:extLst>
       <p:ext uri="{BB962C8B-B14F-4D97-AF65-F5344CB8AC3E}">
-        <p14:creationId xmlns:p14="http://schemas.microsoft.com/office/powerpoint/2010/main" val="2107834342"/>
+        <p14:creationId xmlns:p14="http://schemas.microsoft.com/office/powerpoint/2010/main" val="1401197113"/>
       </p:ext>
     </p:extLst>
   </p:cSld>
@@ -1724,7 +1724,7 @@
           <a:p>
             <a:fld id="{DAF893F0-10B0-447B-BEF1-194A0B612EFC}" type="datetimeFigureOut">
               <a:rPr lang="en-US" smtClean="0"/>
-              <a:t>10/27/2021</a:t>
+              <a:t>10/28/2021</a:t>
             </a:fld>
             <a:endParaRPr lang="en-US"/>
           </a:p>
@@ -1775,7 +1775,7 @@
     </p:spTree>
     <p:extLst>
       <p:ext uri="{BB962C8B-B14F-4D97-AF65-F5344CB8AC3E}">
-        <p14:creationId xmlns:p14="http://schemas.microsoft.com/office/powerpoint/2010/main" val="188304231"/>
+        <p14:creationId xmlns:p14="http://schemas.microsoft.com/office/powerpoint/2010/main" val="1024934957"/>
       </p:ext>
     </p:extLst>
   </p:cSld>
@@ -1819,7 +1819,7 @@
           <a:p>
             <a:fld id="{DAF893F0-10B0-447B-BEF1-194A0B612EFC}" type="datetimeFigureOut">
               <a:rPr lang="en-US" smtClean="0"/>
-              <a:t>10/27/2021</a:t>
+              <a:t>10/28/2021</a:t>
             </a:fld>
             <a:endParaRPr lang="en-US"/>
           </a:p>
@@ -1870,7 +1870,7 @@
     </p:spTree>
     <p:extLst>
       <p:ext uri="{BB962C8B-B14F-4D97-AF65-F5344CB8AC3E}">
-        <p14:creationId xmlns:p14="http://schemas.microsoft.com/office/powerpoint/2010/main" val="727374244"/>
+        <p14:creationId xmlns:p14="http://schemas.microsoft.com/office/powerpoint/2010/main" val="974484526"/>
       </p:ext>
     </p:extLst>
   </p:cSld>
@@ -1909,15 +1909,15 @@
         </p:nvSpPr>
         <p:spPr>
           <a:xfrm>
-            <a:off x="1133714" y="1036320"/>
-            <a:ext cx="5308520" cy="3627120"/>
+            <a:off x="1259682" y="1036320"/>
+            <a:ext cx="5898356" cy="3627120"/>
           </a:xfrm>
         </p:spPr>
         <p:txBody>
           <a:bodyPr anchor="b"/>
           <a:lstStyle>
             <a:lvl1pPr>
-              <a:defRPr sz="5760"/>
+              <a:defRPr sz="6400"/>
             </a:lvl1pPr>
           </a:lstStyle>
           <a:p>
@@ -1941,39 +1941,39 @@
         </p:nvSpPr>
         <p:spPr>
           <a:xfrm>
-            <a:off x="6997304" y="2238167"/>
-            <a:ext cx="8332470" cy="11046883"/>
+            <a:off x="7774782" y="2238167"/>
+            <a:ext cx="9258300" cy="11046883"/>
           </a:xfrm>
         </p:spPr>
         <p:txBody>
           <a:bodyPr/>
           <a:lstStyle>
             <a:lvl1pPr>
-              <a:defRPr sz="5760"/>
+              <a:defRPr sz="6400"/>
             </a:lvl1pPr>
             <a:lvl2pPr>
-              <a:defRPr sz="5040"/>
+              <a:defRPr sz="5600"/>
             </a:lvl2pPr>
             <a:lvl3pPr>
-              <a:defRPr sz="4320"/>
+              <a:defRPr sz="4800"/>
             </a:lvl3pPr>
             <a:lvl4pPr>
-              <a:defRPr sz="3600"/>
+              <a:defRPr sz="4000"/>
             </a:lvl4pPr>
             <a:lvl5pPr>
-              <a:defRPr sz="3600"/>
+              <a:defRPr sz="4000"/>
             </a:lvl5pPr>
             <a:lvl6pPr>
-              <a:defRPr sz="3600"/>
+              <a:defRPr sz="4000"/>
             </a:lvl6pPr>
             <a:lvl7pPr>
-              <a:defRPr sz="3600"/>
+              <a:defRPr sz="4000"/>
             </a:lvl7pPr>
             <a:lvl8pPr>
-              <a:defRPr sz="3600"/>
+              <a:defRPr sz="4000"/>
             </a:lvl8pPr>
             <a:lvl9pPr>
-              <a:defRPr sz="3600"/>
+              <a:defRPr sz="4000"/>
             </a:lvl9pPr>
           </a:lstStyle>
           <a:p>
@@ -2026,8 +2026,8 @@
         </p:nvSpPr>
         <p:spPr>
           <a:xfrm>
-            <a:off x="1133714" y="4663440"/>
-            <a:ext cx="5308520" cy="8639599"/>
+            <a:off x="1259682" y="4663440"/>
+            <a:ext cx="5898356" cy="8639599"/>
           </a:xfrm>
         </p:spPr>
         <p:txBody>
@@ -2035,39 +2035,39 @@
           <a:lstStyle>
             <a:lvl1pPr marL="0" indent="0">
               <a:buNone/>
-              <a:defRPr sz="2880"/>
+              <a:defRPr sz="3200"/>
             </a:lvl1pPr>
-            <a:lvl2pPr marL="822960" indent="0">
-              <a:buNone/>
-              <a:defRPr sz="2520"/>
+            <a:lvl2pPr marL="914400" indent="0">
+              <a:buNone/>
+              <a:defRPr sz="2800"/>
             </a:lvl2pPr>
-            <a:lvl3pPr marL="1645920" indent="0">
-              <a:buNone/>
-              <a:defRPr sz="2160"/>
+            <a:lvl3pPr marL="1828800" indent="0">
+              <a:buNone/>
+              <a:defRPr sz="2400"/>
             </a:lvl3pPr>
-            <a:lvl4pPr marL="2468880" indent="0">
-              <a:buNone/>
-              <a:defRPr sz="1800"/>
+            <a:lvl4pPr marL="2743200" indent="0">
+              <a:buNone/>
+              <a:defRPr sz="2000"/>
             </a:lvl4pPr>
-            <a:lvl5pPr marL="3291840" indent="0">
-              <a:buNone/>
-              <a:defRPr sz="1800"/>
+            <a:lvl5pPr marL="3657600" indent="0">
+              <a:buNone/>
+              <a:defRPr sz="2000"/>
             </a:lvl5pPr>
-            <a:lvl6pPr marL="4114800" indent="0">
-              <a:buNone/>
-              <a:defRPr sz="1800"/>
+            <a:lvl6pPr marL="4572000" indent="0">
+              <a:buNone/>
+              <a:defRPr sz="2000"/>
             </a:lvl6pPr>
-            <a:lvl7pPr marL="4937760" indent="0">
-              <a:buNone/>
-              <a:defRPr sz="1800"/>
+            <a:lvl7pPr marL="5486400" indent="0">
+              <a:buNone/>
+              <a:defRPr sz="2000"/>
             </a:lvl7pPr>
-            <a:lvl8pPr marL="5760720" indent="0">
-              <a:buNone/>
-              <a:defRPr sz="1800"/>
+            <a:lvl8pPr marL="6400800" indent="0">
+              <a:buNone/>
+              <a:defRPr sz="2000"/>
             </a:lvl8pPr>
-            <a:lvl9pPr marL="6583680" indent="0">
-              <a:buNone/>
-              <a:defRPr sz="1800"/>
+            <a:lvl9pPr marL="7315200" indent="0">
+              <a:buNone/>
+              <a:defRPr sz="2000"/>
             </a:lvl9pPr>
           </a:lstStyle>
           <a:p>
@@ -2096,7 +2096,7 @@
           <a:p>
             <a:fld id="{DAF893F0-10B0-447B-BEF1-194A0B612EFC}" type="datetimeFigureOut">
               <a:rPr lang="en-US" smtClean="0"/>
-              <a:t>10/27/2021</a:t>
+              <a:t>10/28/2021</a:t>
             </a:fld>
             <a:endParaRPr lang="en-US"/>
           </a:p>
@@ -2147,7 +2147,7 @@
     </p:spTree>
     <p:extLst>
       <p:ext uri="{BB962C8B-B14F-4D97-AF65-F5344CB8AC3E}">
-        <p14:creationId xmlns:p14="http://schemas.microsoft.com/office/powerpoint/2010/main" val="56668462"/>
+        <p14:creationId xmlns:p14="http://schemas.microsoft.com/office/powerpoint/2010/main" val="1567466935"/>
       </p:ext>
     </p:extLst>
   </p:cSld>
@@ -2186,15 +2186,15 @@
         </p:nvSpPr>
         <p:spPr>
           <a:xfrm>
-            <a:off x="1133714" y="1036320"/>
-            <a:ext cx="5308520" cy="3627120"/>
+            <a:off x="1259682" y="1036320"/>
+            <a:ext cx="5898356" cy="3627120"/>
           </a:xfrm>
         </p:spPr>
         <p:txBody>
           <a:bodyPr anchor="b"/>
           <a:lstStyle>
             <a:lvl1pPr>
-              <a:defRPr sz="5760"/>
+              <a:defRPr sz="6400"/>
             </a:lvl1pPr>
           </a:lstStyle>
           <a:p>
@@ -2218,8 +2218,8 @@
         </p:nvSpPr>
         <p:spPr>
           <a:xfrm>
-            <a:off x="6997304" y="2238167"/>
-            <a:ext cx="8332470" cy="11046883"/>
+            <a:off x="7774782" y="2238167"/>
+            <a:ext cx="9258300" cy="11046883"/>
           </a:xfrm>
         </p:spPr>
         <p:txBody>
@@ -2227,39 +2227,39 @@
           <a:lstStyle>
             <a:lvl1pPr marL="0" indent="0">
               <a:buNone/>
-              <a:defRPr sz="5760"/>
+              <a:defRPr sz="6400"/>
             </a:lvl1pPr>
-            <a:lvl2pPr marL="822960" indent="0">
-              <a:buNone/>
-              <a:defRPr sz="5040"/>
+            <a:lvl2pPr marL="914400" indent="0">
+              <a:buNone/>
+              <a:defRPr sz="5600"/>
             </a:lvl2pPr>
-            <a:lvl3pPr marL="1645920" indent="0">
-              <a:buNone/>
-              <a:defRPr sz="4320"/>
+            <a:lvl3pPr marL="1828800" indent="0">
+              <a:buNone/>
+              <a:defRPr sz="4800"/>
             </a:lvl3pPr>
-            <a:lvl4pPr marL="2468880" indent="0">
-              <a:buNone/>
-              <a:defRPr sz="3600"/>
+            <a:lvl4pPr marL="2743200" indent="0">
+              <a:buNone/>
+              <a:defRPr sz="4000"/>
             </a:lvl4pPr>
-            <a:lvl5pPr marL="3291840" indent="0">
-              <a:buNone/>
-              <a:defRPr sz="3600"/>
+            <a:lvl5pPr marL="3657600" indent="0">
+              <a:buNone/>
+              <a:defRPr sz="4000"/>
             </a:lvl5pPr>
-            <a:lvl6pPr marL="4114800" indent="0">
-              <a:buNone/>
-              <a:defRPr sz="3600"/>
+            <a:lvl6pPr marL="4572000" indent="0">
+              <a:buNone/>
+              <a:defRPr sz="4000"/>
             </a:lvl6pPr>
-            <a:lvl7pPr marL="4937760" indent="0">
-              <a:buNone/>
-              <a:defRPr sz="3600"/>
+            <a:lvl7pPr marL="5486400" indent="0">
+              <a:buNone/>
+              <a:defRPr sz="4000"/>
             </a:lvl7pPr>
-            <a:lvl8pPr marL="5760720" indent="0">
-              <a:buNone/>
-              <a:defRPr sz="3600"/>
+            <a:lvl8pPr marL="6400800" indent="0">
+              <a:buNone/>
+              <a:defRPr sz="4000"/>
             </a:lvl8pPr>
-            <a:lvl9pPr marL="6583680" indent="0">
-              <a:buNone/>
-              <a:defRPr sz="3600"/>
+            <a:lvl9pPr marL="7315200" indent="0">
+              <a:buNone/>
+              <a:defRPr sz="4000"/>
             </a:lvl9pPr>
           </a:lstStyle>
           <a:p>
@@ -2283,8 +2283,8 @@
         </p:nvSpPr>
         <p:spPr>
           <a:xfrm>
-            <a:off x="1133714" y="4663440"/>
-            <a:ext cx="5308520" cy="8639599"/>
+            <a:off x="1259682" y="4663440"/>
+            <a:ext cx="5898356" cy="8639599"/>
           </a:xfrm>
         </p:spPr>
         <p:txBody>
@@ -2292,39 +2292,39 @@
           <a:lstStyle>
             <a:lvl1pPr marL="0" indent="0">
               <a:buNone/>
-              <a:defRPr sz="2880"/>
+              <a:defRPr sz="3200"/>
             </a:lvl1pPr>
-            <a:lvl2pPr marL="822960" indent="0">
-              <a:buNone/>
-              <a:defRPr sz="2520"/>
+            <a:lvl2pPr marL="914400" indent="0">
+              <a:buNone/>
+              <a:defRPr sz="2800"/>
             </a:lvl2pPr>
-            <a:lvl3pPr marL="1645920" indent="0">
-              <a:buNone/>
-              <a:defRPr sz="2160"/>
+            <a:lvl3pPr marL="1828800" indent="0">
+              <a:buNone/>
+              <a:defRPr sz="2400"/>
             </a:lvl3pPr>
-            <a:lvl4pPr marL="2468880" indent="0">
-              <a:buNone/>
-              <a:defRPr sz="1800"/>
+            <a:lvl4pPr marL="2743200" indent="0">
+              <a:buNone/>
+              <a:defRPr sz="2000"/>
             </a:lvl4pPr>
-            <a:lvl5pPr marL="3291840" indent="0">
-              <a:buNone/>
-              <a:defRPr sz="1800"/>
+            <a:lvl5pPr marL="3657600" indent="0">
+              <a:buNone/>
+              <a:defRPr sz="2000"/>
             </a:lvl5pPr>
-            <a:lvl6pPr marL="4114800" indent="0">
-              <a:buNone/>
-              <a:defRPr sz="1800"/>
+            <a:lvl6pPr marL="4572000" indent="0">
+              <a:buNone/>
+              <a:defRPr sz="2000"/>
             </a:lvl6pPr>
-            <a:lvl7pPr marL="4937760" indent="0">
-              <a:buNone/>
-              <a:defRPr sz="1800"/>
+            <a:lvl7pPr marL="5486400" indent="0">
+              <a:buNone/>
+              <a:defRPr sz="2000"/>
             </a:lvl7pPr>
-            <a:lvl8pPr marL="5760720" indent="0">
-              <a:buNone/>
-              <a:defRPr sz="1800"/>
+            <a:lvl8pPr marL="6400800" indent="0">
+              <a:buNone/>
+              <a:defRPr sz="2000"/>
             </a:lvl8pPr>
-            <a:lvl9pPr marL="6583680" indent="0">
-              <a:buNone/>
-              <a:defRPr sz="1800"/>
+            <a:lvl9pPr marL="7315200" indent="0">
+              <a:buNone/>
+              <a:defRPr sz="2000"/>
             </a:lvl9pPr>
           </a:lstStyle>
           <a:p>
@@ -2353,7 +2353,7 @@
           <a:p>
             <a:fld id="{DAF893F0-10B0-447B-BEF1-194A0B612EFC}" type="datetimeFigureOut">
               <a:rPr lang="en-US" smtClean="0"/>
-              <a:t>10/27/2021</a:t>
+              <a:t>10/28/2021</a:t>
             </a:fld>
             <a:endParaRPr lang="en-US"/>
           </a:p>
@@ -2404,7 +2404,7 @@
     </p:spTree>
     <p:extLst>
       <p:ext uri="{BB962C8B-B14F-4D97-AF65-F5344CB8AC3E}">
-        <p14:creationId xmlns:p14="http://schemas.microsoft.com/office/powerpoint/2010/main" val="113426924"/>
+        <p14:creationId xmlns:p14="http://schemas.microsoft.com/office/powerpoint/2010/main" val="4283589572"/>
       </p:ext>
     </p:extLst>
   </p:cSld>
@@ -2448,8 +2448,8 @@
         </p:nvSpPr>
         <p:spPr>
           <a:xfrm>
-            <a:off x="1131570" y="827620"/>
-            <a:ext cx="14196060" cy="3004609"/>
+            <a:off x="1257300" y="827620"/>
+            <a:ext cx="15773400" cy="3004609"/>
           </a:xfrm>
           <a:prstGeom prst="rect">
             <a:avLst/>
@@ -2481,8 +2481,8 @@
         </p:nvSpPr>
         <p:spPr>
           <a:xfrm>
-            <a:off x="1131570" y="4138083"/>
-            <a:ext cx="14196060" cy="9863033"/>
+            <a:off x="1257300" y="4138083"/>
+            <a:ext cx="15773400" cy="9863033"/>
           </a:xfrm>
           <a:prstGeom prst="rect">
             <a:avLst/>
@@ -2543,8 +2543,8 @@
         </p:nvSpPr>
         <p:spPr>
           <a:xfrm>
-            <a:off x="1131570" y="14407730"/>
-            <a:ext cx="3703320" cy="827617"/>
+            <a:off x="1257300" y="14407730"/>
+            <a:ext cx="4114800" cy="827617"/>
           </a:xfrm>
           <a:prstGeom prst="rect">
             <a:avLst/>
@@ -2554,7 +2554,7 @@
           <a:bodyPr vert="horz" lIns="91440" tIns="45720" rIns="91440" bIns="45720" rtlCol="0" anchor="ctr"/>
           <a:lstStyle>
             <a:lvl1pPr algn="l">
-              <a:defRPr sz="2160">
+              <a:defRPr sz="2400">
                 <a:solidFill>
                   <a:schemeClr val="tx1">
                     <a:tint val="75000"/>
@@ -2566,7 +2566,7 @@
           <a:p>
             <a:fld id="{DAF893F0-10B0-447B-BEF1-194A0B612EFC}" type="datetimeFigureOut">
               <a:rPr lang="en-US" smtClean="0"/>
-              <a:t>10/27/2021</a:t>
+              <a:t>10/28/2021</a:t>
             </a:fld>
             <a:endParaRPr lang="en-US"/>
           </a:p>
@@ -2584,8 +2584,8 @@
         </p:nvSpPr>
         <p:spPr>
           <a:xfrm>
-            <a:off x="5452110" y="14407730"/>
-            <a:ext cx="5554980" cy="827617"/>
+            <a:off x="6057900" y="14407730"/>
+            <a:ext cx="6172200" cy="827617"/>
           </a:xfrm>
           <a:prstGeom prst="rect">
             <a:avLst/>
@@ -2595,7 +2595,7 @@
           <a:bodyPr vert="horz" lIns="91440" tIns="45720" rIns="91440" bIns="45720" rtlCol="0" anchor="ctr"/>
           <a:lstStyle>
             <a:lvl1pPr algn="ctr">
-              <a:defRPr sz="2160">
+              <a:defRPr sz="2400">
                 <a:solidFill>
                   <a:schemeClr val="tx1">
                     <a:tint val="75000"/>
@@ -2621,8 +2621,8 @@
         </p:nvSpPr>
         <p:spPr>
           <a:xfrm>
-            <a:off x="11624310" y="14407730"/>
-            <a:ext cx="3703320" cy="827617"/>
+            <a:off x="12915900" y="14407730"/>
+            <a:ext cx="4114800" cy="827617"/>
           </a:xfrm>
           <a:prstGeom prst="rect">
             <a:avLst/>
@@ -2632,7 +2632,7 @@
           <a:bodyPr vert="horz" lIns="91440" tIns="45720" rIns="91440" bIns="45720" rtlCol="0" anchor="ctr"/>
           <a:lstStyle>
             <a:lvl1pPr algn="r">
-              <a:defRPr sz="2160">
+              <a:defRPr sz="2400">
                 <a:solidFill>
                   <a:schemeClr val="tx1">
                     <a:tint val="75000"/>
@@ -2653,27 +2653,27 @@
     </p:spTree>
     <p:extLst>
       <p:ext uri="{BB962C8B-B14F-4D97-AF65-F5344CB8AC3E}">
-        <p14:creationId xmlns:p14="http://schemas.microsoft.com/office/powerpoint/2010/main" val="4035494217"/>
+        <p14:creationId xmlns:p14="http://schemas.microsoft.com/office/powerpoint/2010/main" val="3980008296"/>
       </p:ext>
     </p:extLst>
   </p:cSld>
   <p:clrMap bg1="lt1" tx1="dk1" bg2="lt2" tx2="dk2" accent1="accent1" accent2="accent2" accent3="accent3" accent4="accent4" accent5="accent5" accent6="accent6" hlink="hlink" folHlink="folHlink"/>
   <p:sldLayoutIdLst>
-    <p:sldLayoutId id="2147483721" r:id="rId1"/>
-    <p:sldLayoutId id="2147483722" r:id="rId2"/>
-    <p:sldLayoutId id="2147483723" r:id="rId3"/>
-    <p:sldLayoutId id="2147483724" r:id="rId4"/>
-    <p:sldLayoutId id="2147483725" r:id="rId5"/>
-    <p:sldLayoutId id="2147483726" r:id="rId6"/>
-    <p:sldLayoutId id="2147483727" r:id="rId7"/>
-    <p:sldLayoutId id="2147483728" r:id="rId8"/>
-    <p:sldLayoutId id="2147483729" r:id="rId9"/>
-    <p:sldLayoutId id="2147483730" r:id="rId10"/>
-    <p:sldLayoutId id="2147483731" r:id="rId11"/>
+    <p:sldLayoutId id="2147483733" r:id="rId1"/>
+    <p:sldLayoutId id="2147483734" r:id="rId2"/>
+    <p:sldLayoutId id="2147483735" r:id="rId3"/>
+    <p:sldLayoutId id="2147483736" r:id="rId4"/>
+    <p:sldLayoutId id="2147483737" r:id="rId5"/>
+    <p:sldLayoutId id="2147483738" r:id="rId6"/>
+    <p:sldLayoutId id="2147483739" r:id="rId7"/>
+    <p:sldLayoutId id="2147483740" r:id="rId8"/>
+    <p:sldLayoutId id="2147483741" r:id="rId9"/>
+    <p:sldLayoutId id="2147483742" r:id="rId10"/>
+    <p:sldLayoutId id="2147483743" r:id="rId11"/>
   </p:sldLayoutIdLst>
   <p:txStyles>
     <p:titleStyle>
-      <a:lvl1pPr algn="l" defTabSz="1645920" rtl="0" eaLnBrk="1" latinLnBrk="0" hangingPunct="1">
+      <a:lvl1pPr algn="l" defTabSz="1828800" rtl="0" eaLnBrk="1" latinLnBrk="0" hangingPunct="1">
         <a:lnSpc>
           <a:spcPct val="90000"/>
         </a:lnSpc>
@@ -2681,7 +2681,7 @@
           <a:spcPct val="0"/>
         </a:spcBef>
         <a:buNone/>
-        <a:defRPr sz="7920" kern="1200">
+        <a:defRPr sz="8800" kern="1200">
           <a:solidFill>
             <a:schemeClr val="tx1"/>
           </a:solidFill>
@@ -2692,16 +2692,16 @@
       </a:lvl1pPr>
     </p:titleStyle>
     <p:bodyStyle>
-      <a:lvl1pPr marL="411480" indent="-411480" algn="l" defTabSz="1645920" rtl="0" eaLnBrk="1" latinLnBrk="0" hangingPunct="1">
+      <a:lvl1pPr marL="457200" indent="-457200" algn="l" defTabSz="1828800" rtl="0" eaLnBrk="1" latinLnBrk="0" hangingPunct="1">
         <a:lnSpc>
           <a:spcPct val="90000"/>
         </a:lnSpc>
         <a:spcBef>
-          <a:spcPts val="1800"/>
+          <a:spcPts val="2000"/>
         </a:spcBef>
         <a:buFont typeface="Arial" panose="020B0604020202020204" pitchFamily="34" charset="0"/>
         <a:buChar char="•"/>
-        <a:defRPr sz="5040" kern="1200">
+        <a:defRPr sz="5600" kern="1200">
           <a:solidFill>
             <a:schemeClr val="tx1"/>
           </a:solidFill>
@@ -2710,16 +2710,16 @@
           <a:cs typeface="+mn-cs"/>
         </a:defRPr>
       </a:lvl1pPr>
-      <a:lvl2pPr marL="1234440" indent="-411480" algn="l" defTabSz="1645920" rtl="0" eaLnBrk="1" latinLnBrk="0" hangingPunct="1">
+      <a:lvl2pPr marL="1371600" indent="-457200" algn="l" defTabSz="1828800" rtl="0" eaLnBrk="1" latinLnBrk="0" hangingPunct="1">
         <a:lnSpc>
           <a:spcPct val="90000"/>
         </a:lnSpc>
         <a:spcBef>
-          <a:spcPts val="900"/>
+          <a:spcPts val="1000"/>
         </a:spcBef>
         <a:buFont typeface="Arial" panose="020B0604020202020204" pitchFamily="34" charset="0"/>
         <a:buChar char="•"/>
-        <a:defRPr sz="4320" kern="1200">
+        <a:defRPr sz="4800" kern="1200">
           <a:solidFill>
             <a:schemeClr val="tx1"/>
           </a:solidFill>
@@ -2728,12 +2728,30 @@
           <a:cs typeface="+mn-cs"/>
         </a:defRPr>
       </a:lvl2pPr>
-      <a:lvl3pPr marL="2057400" indent="-411480" algn="l" defTabSz="1645920" rtl="0" eaLnBrk="1" latinLnBrk="0" hangingPunct="1">
+      <a:lvl3pPr marL="2286000" indent="-457200" algn="l" defTabSz="1828800" rtl="0" eaLnBrk="1" latinLnBrk="0" hangingPunct="1">
         <a:lnSpc>
           <a:spcPct val="90000"/>
         </a:lnSpc>
         <a:spcBef>
-          <a:spcPts val="900"/>
+          <a:spcPts val="1000"/>
+        </a:spcBef>
+        <a:buFont typeface="Arial" panose="020B0604020202020204" pitchFamily="34" charset="0"/>
+        <a:buChar char="•"/>
+        <a:defRPr sz="4000" kern="1200">
+          <a:solidFill>
+            <a:schemeClr val="tx1"/>
+          </a:solidFill>
+          <a:latin typeface="+mn-lt"/>
+          <a:ea typeface="+mn-ea"/>
+          <a:cs typeface="+mn-cs"/>
+        </a:defRPr>
+      </a:lvl3pPr>
+      <a:lvl4pPr marL="3200400" indent="-457200" algn="l" defTabSz="1828800" rtl="0" eaLnBrk="1" latinLnBrk="0" hangingPunct="1">
+        <a:lnSpc>
+          <a:spcPct val="90000"/>
+        </a:lnSpc>
+        <a:spcBef>
+          <a:spcPts val="1000"/>
         </a:spcBef>
         <a:buFont typeface="Arial" panose="020B0604020202020204" pitchFamily="34" charset="0"/>
         <a:buChar char="•"/>
@@ -2745,35 +2763,17 @@
           <a:ea typeface="+mn-ea"/>
           <a:cs typeface="+mn-cs"/>
         </a:defRPr>
-      </a:lvl3pPr>
-      <a:lvl4pPr marL="2880360" indent="-411480" algn="l" defTabSz="1645920" rtl="0" eaLnBrk="1" latinLnBrk="0" hangingPunct="1">
+      </a:lvl4pPr>
+      <a:lvl5pPr marL="4114800" indent="-457200" algn="l" defTabSz="1828800" rtl="0" eaLnBrk="1" latinLnBrk="0" hangingPunct="1">
         <a:lnSpc>
           <a:spcPct val="90000"/>
         </a:lnSpc>
         <a:spcBef>
-          <a:spcPts val="900"/>
+          <a:spcPts val="1000"/>
         </a:spcBef>
         <a:buFont typeface="Arial" panose="020B0604020202020204" pitchFamily="34" charset="0"/>
         <a:buChar char="•"/>
-        <a:defRPr sz="3240" kern="1200">
-          <a:solidFill>
-            <a:schemeClr val="tx1"/>
-          </a:solidFill>
-          <a:latin typeface="+mn-lt"/>
-          <a:ea typeface="+mn-ea"/>
-          <a:cs typeface="+mn-cs"/>
-        </a:defRPr>
-      </a:lvl4pPr>
-      <a:lvl5pPr marL="3703320" indent="-411480" algn="l" defTabSz="1645920" rtl="0" eaLnBrk="1" latinLnBrk="0" hangingPunct="1">
-        <a:lnSpc>
-          <a:spcPct val="90000"/>
-        </a:lnSpc>
-        <a:spcBef>
-          <a:spcPts val="900"/>
-        </a:spcBef>
-        <a:buFont typeface="Arial" panose="020B0604020202020204" pitchFamily="34" charset="0"/>
-        <a:buChar char="•"/>
-        <a:defRPr sz="3240" kern="1200">
+        <a:defRPr sz="3600" kern="1200">
           <a:solidFill>
             <a:schemeClr val="tx1"/>
           </a:solidFill>
@@ -2782,16 +2782,16 @@
           <a:cs typeface="+mn-cs"/>
         </a:defRPr>
       </a:lvl5pPr>
-      <a:lvl6pPr marL="4526280" indent="-411480" algn="l" defTabSz="1645920" rtl="0" eaLnBrk="1" latinLnBrk="0" hangingPunct="1">
+      <a:lvl6pPr marL="5029200" indent="-457200" algn="l" defTabSz="1828800" rtl="0" eaLnBrk="1" latinLnBrk="0" hangingPunct="1">
         <a:lnSpc>
           <a:spcPct val="90000"/>
         </a:lnSpc>
         <a:spcBef>
-          <a:spcPts val="900"/>
+          <a:spcPts val="1000"/>
         </a:spcBef>
         <a:buFont typeface="Arial" panose="020B0604020202020204" pitchFamily="34" charset="0"/>
         <a:buChar char="•"/>
-        <a:defRPr sz="3240" kern="1200">
+        <a:defRPr sz="3600" kern="1200">
           <a:solidFill>
             <a:schemeClr val="tx1"/>
           </a:solidFill>
@@ -2800,16 +2800,16 @@
           <a:cs typeface="+mn-cs"/>
         </a:defRPr>
       </a:lvl6pPr>
-      <a:lvl7pPr marL="5349240" indent="-411480" algn="l" defTabSz="1645920" rtl="0" eaLnBrk="1" latinLnBrk="0" hangingPunct="1">
+      <a:lvl7pPr marL="5943600" indent="-457200" algn="l" defTabSz="1828800" rtl="0" eaLnBrk="1" latinLnBrk="0" hangingPunct="1">
         <a:lnSpc>
           <a:spcPct val="90000"/>
         </a:lnSpc>
         <a:spcBef>
-          <a:spcPts val="900"/>
+          <a:spcPts val="1000"/>
         </a:spcBef>
         <a:buFont typeface="Arial" panose="020B0604020202020204" pitchFamily="34" charset="0"/>
         <a:buChar char="•"/>
-        <a:defRPr sz="3240" kern="1200">
+        <a:defRPr sz="3600" kern="1200">
           <a:solidFill>
             <a:schemeClr val="tx1"/>
           </a:solidFill>
@@ -2818,16 +2818,16 @@
           <a:cs typeface="+mn-cs"/>
         </a:defRPr>
       </a:lvl7pPr>
-      <a:lvl8pPr marL="6172200" indent="-411480" algn="l" defTabSz="1645920" rtl="0" eaLnBrk="1" latinLnBrk="0" hangingPunct="1">
+      <a:lvl8pPr marL="6858000" indent="-457200" algn="l" defTabSz="1828800" rtl="0" eaLnBrk="1" latinLnBrk="0" hangingPunct="1">
         <a:lnSpc>
           <a:spcPct val="90000"/>
         </a:lnSpc>
         <a:spcBef>
-          <a:spcPts val="900"/>
+          <a:spcPts val="1000"/>
         </a:spcBef>
         <a:buFont typeface="Arial" panose="020B0604020202020204" pitchFamily="34" charset="0"/>
         <a:buChar char="•"/>
-        <a:defRPr sz="3240" kern="1200">
+        <a:defRPr sz="3600" kern="1200">
           <a:solidFill>
             <a:schemeClr val="tx1"/>
           </a:solidFill>
@@ -2836,16 +2836,16 @@
           <a:cs typeface="+mn-cs"/>
         </a:defRPr>
       </a:lvl8pPr>
-      <a:lvl9pPr marL="6995160" indent="-411480" algn="l" defTabSz="1645920" rtl="0" eaLnBrk="1" latinLnBrk="0" hangingPunct="1">
+      <a:lvl9pPr marL="7772400" indent="-457200" algn="l" defTabSz="1828800" rtl="0" eaLnBrk="1" latinLnBrk="0" hangingPunct="1">
         <a:lnSpc>
           <a:spcPct val="90000"/>
         </a:lnSpc>
         <a:spcBef>
-          <a:spcPts val="900"/>
+          <a:spcPts val="1000"/>
         </a:spcBef>
         <a:buFont typeface="Arial" panose="020B0604020202020204" pitchFamily="34" charset="0"/>
         <a:buChar char="•"/>
-        <a:defRPr sz="3240" kern="1200">
+        <a:defRPr sz="3600" kern="1200">
           <a:solidFill>
             <a:schemeClr val="tx1"/>
           </a:solidFill>
@@ -2859,8 +2859,8 @@
       <a:defPPr>
         <a:defRPr lang="en-US"/>
       </a:defPPr>
-      <a:lvl1pPr marL="0" algn="l" defTabSz="1645920" rtl="0" eaLnBrk="1" latinLnBrk="0" hangingPunct="1">
-        <a:defRPr sz="3240" kern="1200">
+      <a:lvl1pPr marL="0" algn="l" defTabSz="1828800" rtl="0" eaLnBrk="1" latinLnBrk="0" hangingPunct="1">
+        <a:defRPr sz="3600" kern="1200">
           <a:solidFill>
             <a:schemeClr val="tx1"/>
           </a:solidFill>
@@ -2869,8 +2869,8 @@
           <a:cs typeface="+mn-cs"/>
         </a:defRPr>
       </a:lvl1pPr>
-      <a:lvl2pPr marL="822960" algn="l" defTabSz="1645920" rtl="0" eaLnBrk="1" latinLnBrk="0" hangingPunct="1">
-        <a:defRPr sz="3240" kern="1200">
+      <a:lvl2pPr marL="914400" algn="l" defTabSz="1828800" rtl="0" eaLnBrk="1" latinLnBrk="0" hangingPunct="1">
+        <a:defRPr sz="3600" kern="1200">
           <a:solidFill>
             <a:schemeClr val="tx1"/>
           </a:solidFill>
@@ -2879,8 +2879,8 @@
           <a:cs typeface="+mn-cs"/>
         </a:defRPr>
       </a:lvl2pPr>
-      <a:lvl3pPr marL="1645920" algn="l" defTabSz="1645920" rtl="0" eaLnBrk="1" latinLnBrk="0" hangingPunct="1">
-        <a:defRPr sz="3240" kern="1200">
+      <a:lvl3pPr marL="1828800" algn="l" defTabSz="1828800" rtl="0" eaLnBrk="1" latinLnBrk="0" hangingPunct="1">
+        <a:defRPr sz="3600" kern="1200">
           <a:solidFill>
             <a:schemeClr val="tx1"/>
           </a:solidFill>
@@ -2889,8 +2889,8 @@
           <a:cs typeface="+mn-cs"/>
         </a:defRPr>
       </a:lvl3pPr>
-      <a:lvl4pPr marL="2468880" algn="l" defTabSz="1645920" rtl="0" eaLnBrk="1" latinLnBrk="0" hangingPunct="1">
-        <a:defRPr sz="3240" kern="1200">
+      <a:lvl4pPr marL="2743200" algn="l" defTabSz="1828800" rtl="0" eaLnBrk="1" latinLnBrk="0" hangingPunct="1">
+        <a:defRPr sz="3600" kern="1200">
           <a:solidFill>
             <a:schemeClr val="tx1"/>
           </a:solidFill>
@@ -2899,8 +2899,8 @@
           <a:cs typeface="+mn-cs"/>
         </a:defRPr>
       </a:lvl4pPr>
-      <a:lvl5pPr marL="3291840" algn="l" defTabSz="1645920" rtl="0" eaLnBrk="1" latinLnBrk="0" hangingPunct="1">
-        <a:defRPr sz="3240" kern="1200">
+      <a:lvl5pPr marL="3657600" algn="l" defTabSz="1828800" rtl="0" eaLnBrk="1" latinLnBrk="0" hangingPunct="1">
+        <a:defRPr sz="3600" kern="1200">
           <a:solidFill>
             <a:schemeClr val="tx1"/>
           </a:solidFill>
@@ -2909,8 +2909,8 @@
           <a:cs typeface="+mn-cs"/>
         </a:defRPr>
       </a:lvl5pPr>
-      <a:lvl6pPr marL="4114800" algn="l" defTabSz="1645920" rtl="0" eaLnBrk="1" latinLnBrk="0" hangingPunct="1">
-        <a:defRPr sz="3240" kern="1200">
+      <a:lvl6pPr marL="4572000" algn="l" defTabSz="1828800" rtl="0" eaLnBrk="1" latinLnBrk="0" hangingPunct="1">
+        <a:defRPr sz="3600" kern="1200">
           <a:solidFill>
             <a:schemeClr val="tx1"/>
           </a:solidFill>
@@ -2919,8 +2919,8 @@
           <a:cs typeface="+mn-cs"/>
         </a:defRPr>
       </a:lvl6pPr>
-      <a:lvl7pPr marL="4937760" algn="l" defTabSz="1645920" rtl="0" eaLnBrk="1" latinLnBrk="0" hangingPunct="1">
-        <a:defRPr sz="3240" kern="1200">
+      <a:lvl7pPr marL="5486400" algn="l" defTabSz="1828800" rtl="0" eaLnBrk="1" latinLnBrk="0" hangingPunct="1">
+        <a:defRPr sz="3600" kern="1200">
           <a:solidFill>
             <a:schemeClr val="tx1"/>
           </a:solidFill>
@@ -2929,8 +2929,8 @@
           <a:cs typeface="+mn-cs"/>
         </a:defRPr>
       </a:lvl7pPr>
-      <a:lvl8pPr marL="5760720" algn="l" defTabSz="1645920" rtl="0" eaLnBrk="1" latinLnBrk="0" hangingPunct="1">
-        <a:defRPr sz="3240" kern="1200">
+      <a:lvl8pPr marL="6400800" algn="l" defTabSz="1828800" rtl="0" eaLnBrk="1" latinLnBrk="0" hangingPunct="1">
+        <a:defRPr sz="3600" kern="1200">
           <a:solidFill>
             <a:schemeClr val="tx1"/>
           </a:solidFill>
@@ -2939,8 +2939,8 @@
           <a:cs typeface="+mn-cs"/>
         </a:defRPr>
       </a:lvl8pPr>
-      <a:lvl9pPr marL="6583680" algn="l" defTabSz="1645920" rtl="0" eaLnBrk="1" latinLnBrk="0" hangingPunct="1">
-        <a:defRPr sz="3240" kern="1200">
+      <a:lvl9pPr marL="7315200" algn="l" defTabSz="1828800" rtl="0" eaLnBrk="1" latinLnBrk="0" hangingPunct="1">
+        <a:defRPr sz="3600" kern="1200">
           <a:solidFill>
             <a:schemeClr val="tx1"/>
           </a:solidFill>
@@ -2985,10 +2985,10 @@
         </p:nvGrpSpPr>
         <p:grpSpPr>
           <a:xfrm>
-            <a:off x="-172380" y="83079"/>
-            <a:ext cx="16604588" cy="15461721"/>
-            <a:chOff x="-172380" y="83079"/>
-            <a:chExt cx="16604588" cy="15461721"/>
+            <a:off x="-28979" y="83080"/>
+            <a:ext cx="17375587" cy="15461721"/>
+            <a:chOff x="-943379" y="83079"/>
+            <a:chExt cx="17375587" cy="15461721"/>
           </a:xfrm>
         </p:grpSpPr>
         <p:pic>
@@ -3253,65 +3253,6 @@
             </a:prstGeom>
           </p:spPr>
         </p:pic>
-        <p:sp>
-          <p:nvSpPr>
-            <p:cNvPr id="54" name="TextBox 53">
-              <a:extLst>
-                <a:ext uri="{FF2B5EF4-FFF2-40B4-BE49-F238E27FC236}">
-                  <a16:creationId xmlns:a16="http://schemas.microsoft.com/office/drawing/2014/main" id="{2CB5E9C2-D4D8-424D-897D-BB6C9AEF38D8}"/>
-                </a:ext>
-              </a:extLst>
-            </p:cNvPr>
-            <p:cNvSpPr txBox="1"/>
-            <p:nvPr/>
-          </p:nvSpPr>
-          <p:spPr>
-            <a:xfrm>
-              <a:off x="87618" y="13086294"/>
-              <a:ext cx="1066593" cy="1169551"/>
-            </a:xfrm>
-            <a:prstGeom prst="rect">
-              <a:avLst/>
-            </a:prstGeom>
-            <a:noFill/>
-          </p:spPr>
-          <p:txBody>
-            <a:bodyPr wrap="square" rtlCol="0">
-              <a:spAutoFit/>
-            </a:bodyPr>
-            <a:lstStyle/>
-            <a:p>
-              <a:pPr algn="ctr"/>
-              <a:r>
-                <a:rPr lang="en-US" sz="1400" dirty="0">
-                  <a:latin typeface="Times New Roman" panose="02020603050405020304" pitchFamily="18" charset="0"/>
-                  <a:cs typeface="Times New Roman" panose="02020603050405020304" pitchFamily="18" charset="0"/>
-                </a:rPr>
-                <a:t>Power-law </a:t>
-              </a:r>
-            </a:p>
-            <a:p>
-              <a:pPr algn="ctr"/>
-              <a:r>
-                <a:rPr lang="en-US" sz="1400" dirty="0">
-                  <a:latin typeface="Times New Roman" panose="02020603050405020304" pitchFamily="18" charset="0"/>
-                  <a:cs typeface="Times New Roman" panose="02020603050405020304" pitchFamily="18" charset="0"/>
-                </a:rPr>
-                <a:t>+</a:t>
-              </a:r>
-            </a:p>
-            <a:p>
-              <a:pPr algn="ctr"/>
-              <a:r>
-                <a:rPr lang="en-US" sz="1400" dirty="0">
-                  <a:latin typeface="Times New Roman" panose="02020603050405020304" pitchFamily="18" charset="0"/>
-                  <a:cs typeface="Times New Roman" panose="02020603050405020304" pitchFamily="18" charset="0"/>
-                </a:rPr>
-                <a:t>Correlation in Gaussian Copula</a:t>
-              </a:r>
-            </a:p>
-          </p:txBody>
-        </p:sp>
         <p:grpSp>
           <p:nvGrpSpPr>
             <p:cNvPr id="65" name="Group 64">
@@ -3326,10 +3267,10 @@
           </p:nvGrpSpPr>
           <p:grpSpPr>
             <a:xfrm>
-              <a:off x="68464" y="1055723"/>
-              <a:ext cx="16266910" cy="3516121"/>
-              <a:chOff x="68464" y="1055723"/>
-              <a:chExt cx="16266910" cy="3516121"/>
+              <a:off x="-943379" y="1055723"/>
+              <a:ext cx="17278753" cy="3516121"/>
+              <a:chOff x="-943379" y="1055723"/>
+              <a:chExt cx="17278753" cy="3516121"/>
             </a:xfrm>
           </p:grpSpPr>
           <p:pic>
@@ -3537,8 +3478,8 @@
             </p:nvSpPr>
             <p:spPr>
               <a:xfrm>
-                <a:off x="68464" y="2082574"/>
-                <a:ext cx="1104903" cy="1384995"/>
+                <a:off x="-943379" y="2233714"/>
+                <a:ext cx="2134409" cy="738664"/>
               </a:xfrm>
               <a:prstGeom prst="rect">
                 <a:avLst/>
@@ -3575,20 +3516,47 @@
                 <a:r>
                   <a:rPr lang="en-US" sz="1400" dirty="0">
                     <a:latin typeface="Times New Roman" panose="02020603050405020304" pitchFamily="18" charset="0"/>
+                    <a:ea typeface="Calibri" panose="020F0502020204030204" pitchFamily="34" charset="0"/>
                     <a:cs typeface="Times New Roman" panose="02020603050405020304" pitchFamily="18" charset="0"/>
                   </a:rPr>
-                  <a:t>No Correlation</a:t>
+                  <a:t>c</a:t>
                 </a:r>
-              </a:p>
-              <a:p>
-                <a:pPr algn="ctr"/>
+                <a:r>
+                  <a:rPr lang="en-US" sz="1400" baseline="-25000" dirty="0">
+                    <a:latin typeface="Times New Roman" panose="02020603050405020304" pitchFamily="18" charset="0"/>
+                    <a:ea typeface="Calibri" panose="020F0502020204030204" pitchFamily="34" charset="0"/>
+                    <a:cs typeface="Times New Roman" panose="02020603050405020304" pitchFamily="18" charset="0"/>
+                  </a:rPr>
+                  <a:t>Spearman</a:t>
+                </a:r>
                 <a:r>
                   <a:rPr lang="en-US" sz="1400" dirty="0">
                     <a:latin typeface="Times New Roman" panose="02020603050405020304" pitchFamily="18" charset="0"/>
+                    <a:ea typeface="Calibri" panose="020F0502020204030204" pitchFamily="34" charset="0"/>
                     <a:cs typeface="Times New Roman" panose="02020603050405020304" pitchFamily="18" charset="0"/>
                   </a:rPr>
-                  <a:t>in Gaussian Copula</a:t>
+                  <a:t>(k,&lt;K</a:t>
                 </a:r>
+                <a:r>
+                  <a:rPr lang="en-US" sz="1400" baseline="-25000" dirty="0">
+                    <a:latin typeface="Times New Roman" panose="02020603050405020304" pitchFamily="18" charset="0"/>
+                    <a:ea typeface="Calibri" panose="020F0502020204030204" pitchFamily="34" charset="0"/>
+                    <a:cs typeface="Times New Roman" panose="02020603050405020304" pitchFamily="18" charset="0"/>
+                  </a:rPr>
+                  <a:t>d</a:t>
+                </a:r>
+                <a:r>
+                  <a:rPr lang="en-US" sz="1400" dirty="0">
+                    <a:latin typeface="Times New Roman" panose="02020603050405020304" pitchFamily="18" charset="0"/>
+                    <a:ea typeface="Calibri" panose="020F0502020204030204" pitchFamily="34" charset="0"/>
+                    <a:cs typeface="Times New Roman" panose="02020603050405020304" pitchFamily="18" charset="0"/>
+                  </a:rPr>
+                  <a:t>&gt;) ≈ 0</a:t>
+                </a:r>
+                <a:endParaRPr lang="en-US" sz="1400" dirty="0">
+                  <a:latin typeface="Times New Roman" panose="02020603050405020304" pitchFamily="18" charset="0"/>
+                  <a:cs typeface="Times New Roman" panose="02020603050405020304" pitchFamily="18" charset="0"/>
+                </a:endParaRPr>
               </a:p>
             </p:txBody>
           </p:sp>
@@ -3631,7 +3599,6 @@
                 </a:r>
                 <a:r>
                   <a:rPr lang="en-US" sz="1000" dirty="0">
-                    <a:effectLst/>
                     <a:latin typeface="Times New Roman" panose="02020603050405020304" pitchFamily="18" charset="0"/>
                     <a:ea typeface="Calibri" panose="020F0502020204030204" pitchFamily="34" charset="0"/>
                     <a:cs typeface="Times New Roman" panose="02020603050405020304" pitchFamily="18" charset="0"/>
@@ -3640,7 +3607,6 @@
                 </a:r>
                 <a:r>
                   <a:rPr lang="en-US" sz="1000" baseline="-25000" dirty="0">
-                    <a:effectLst/>
                     <a:latin typeface="Times New Roman" panose="02020603050405020304" pitchFamily="18" charset="0"/>
                     <a:ea typeface="Calibri" panose="020F0502020204030204" pitchFamily="34" charset="0"/>
                     <a:cs typeface="Times New Roman" panose="02020603050405020304" pitchFamily="18" charset="0"/>
@@ -3712,9 +3678,9 @@
             <p:grpSpPr>
               <a:xfrm>
                 <a:off x="4923275" y="1104221"/>
-                <a:ext cx="3790076" cy="3467623"/>
+                <a:ext cx="3790076" cy="3447103"/>
                 <a:chOff x="4940910" y="1104319"/>
-                <a:chExt cx="3790076" cy="3467623"/>
+                <a:chExt cx="3790076" cy="3447103"/>
               </a:xfrm>
             </p:grpSpPr>
             <p:pic>
@@ -3786,7 +3752,6 @@
                   </a:r>
                   <a:r>
                     <a:rPr lang="en-US" sz="1000" dirty="0">
-                      <a:effectLst/>
                       <a:latin typeface="Times New Roman" panose="02020603050405020304" pitchFamily="18" charset="0"/>
                       <a:ea typeface="Calibri" panose="020F0502020204030204" pitchFamily="34" charset="0"/>
                       <a:cs typeface="Times New Roman" panose="02020603050405020304" pitchFamily="18" charset="0"/>
@@ -3795,7 +3760,6 @@
                   </a:r>
                   <a:r>
                     <a:rPr lang="en-US" sz="1000" baseline="-25000" dirty="0">
-                      <a:effectLst/>
                       <a:latin typeface="Times New Roman" panose="02020603050405020304" pitchFamily="18" charset="0"/>
                       <a:ea typeface="Calibri" panose="020F0502020204030204" pitchFamily="34" charset="0"/>
                       <a:cs typeface="Times New Roman" panose="02020603050405020304" pitchFamily="18" charset="0"/>
@@ -3826,7 +3790,7 @@
               </p:nvSpPr>
               <p:spPr>
                 <a:xfrm>
-                  <a:off x="6608912" y="4325721"/>
+                  <a:off x="6608912" y="4305201"/>
                   <a:ext cx="994183" cy="246221"/>
                 </a:xfrm>
                 <a:prstGeom prst="rect">
@@ -3925,7 +3889,6 @@
               <a:p>
                 <a:r>
                   <a:rPr lang="en-US" sz="1000" dirty="0">
-                    <a:effectLst/>
                     <a:latin typeface="Times New Roman" panose="02020603050405020304" pitchFamily="18" charset="0"/>
                     <a:ea typeface="Calibri" panose="020F0502020204030204" pitchFamily="34" charset="0"/>
                   </a:rPr>
@@ -3992,8 +3955,8 @@
             </p:nvSpPr>
             <p:spPr>
               <a:xfrm>
-                <a:off x="14393717" y="4226633"/>
-                <a:ext cx="638316" cy="246221"/>
+                <a:off x="14369672" y="4226633"/>
+                <a:ext cx="686406" cy="248851"/>
               </a:xfrm>
               <a:prstGeom prst="rect">
                 <a:avLst/>
@@ -4008,24 +3971,41 @@
               </a:bodyPr>
               <a:lstStyle/>
               <a:p>
+                <a:pPr algn="ctr">
+                  <a:lnSpc>
+                    <a:spcPct val="107000"/>
+                  </a:lnSpc>
+                  <a:spcAft>
+                    <a:spcPts val="800"/>
+                  </a:spcAft>
+                </a:pPr>
                 <a:r>
                   <a:rPr lang="en-US" sz="1000" dirty="0">
-                    <a:effectLst/>
                     <a:latin typeface="Times New Roman" panose="02020603050405020304" pitchFamily="18" charset="0"/>
                     <a:ea typeface="Calibri" panose="020F0502020204030204" pitchFamily="34" charset="0"/>
+                    <a:cs typeface="Times New Roman" panose="02020603050405020304" pitchFamily="18" charset="0"/>
                   </a:rPr>
                   <a:t>p</a:t>
                 </a:r>
                 <a:r>
                   <a:rPr lang="en-US" sz="1000" baseline="-25000" dirty="0">
-                    <a:effectLst/>
                     <a:latin typeface="Times New Roman" panose="02020603050405020304" pitchFamily="18" charset="0"/>
                     <a:ea typeface="Calibri" panose="020F0502020204030204" pitchFamily="34" charset="0"/>
+                    <a:cs typeface="Times New Roman" panose="02020603050405020304" pitchFamily="18" charset="0"/>
+                  </a:rPr>
+                  <a:t>ij</a:t>
+                </a:r>
+                <a:r>
+                  <a:rPr lang="en-US" sz="1000" baseline="30000" dirty="0">
+                    <a:latin typeface="Times New Roman" panose="02020603050405020304" pitchFamily="18" charset="0"/>
+                    <a:ea typeface="Calibri" panose="020F0502020204030204" pitchFamily="34" charset="0"/>
+                    <a:cs typeface="Times New Roman" panose="02020603050405020304" pitchFamily="18" charset="0"/>
                   </a:rPr>
                   <a:t>conditional</a:t>
                 </a:r>
                 <a:endParaRPr lang="en-US" sz="1000" dirty="0">
-                  <a:latin typeface="Times New Roman" panose="02020603050405020304" pitchFamily="18" charset="0"/>
+                  <a:latin typeface="Calibri" panose="020F0502020204030204" pitchFamily="34" charset="0"/>
+                  <a:ea typeface="Calibri" panose="020F0502020204030204" pitchFamily="34" charset="0"/>
                   <a:cs typeface="Times New Roman" panose="02020603050405020304" pitchFamily="18" charset="0"/>
                 </a:endParaRPr>
               </a:p>
@@ -4085,10 +4065,10 @@
           </p:nvGrpSpPr>
           <p:grpSpPr>
             <a:xfrm>
-              <a:off x="-172380" y="4680627"/>
-              <a:ext cx="16604588" cy="3621027"/>
-              <a:chOff x="-172380" y="4680627"/>
-              <a:chExt cx="16604588" cy="3621027"/>
+              <a:off x="-929486" y="4680627"/>
+              <a:ext cx="17361694" cy="3621027"/>
+              <a:chOff x="-929486" y="4680627"/>
+              <a:chExt cx="17361694" cy="3621027"/>
             </a:xfrm>
           </p:grpSpPr>
           <p:pic>
@@ -4225,8 +4205,8 @@
             </p:nvSpPr>
             <p:spPr>
               <a:xfrm>
-                <a:off x="-172380" y="5851471"/>
-                <a:ext cx="1539657" cy="1384995"/>
+                <a:off x="-929486" y="5924799"/>
+                <a:ext cx="2281677" cy="954107"/>
               </a:xfrm>
               <a:prstGeom prst="rect">
                 <a:avLst/>
@@ -4263,19 +4243,49 @@
                 <a:r>
                   <a:rPr lang="en-US" sz="1400" dirty="0">
                     <a:latin typeface="Times New Roman" panose="02020603050405020304" pitchFamily="18" charset="0"/>
+                    <a:ea typeface="Calibri" panose="020F0502020204030204" pitchFamily="34" charset="0"/>
                     <a:cs typeface="Times New Roman" panose="02020603050405020304" pitchFamily="18" charset="0"/>
                   </a:rPr>
-                  <a:t>Correlation</a:t>
+                  <a:t>c</a:t>
                 </a:r>
-              </a:p>
-              <a:p>
-                <a:pPr algn="ctr"/>
+                <a:r>
+                  <a:rPr lang="en-US" sz="1400" baseline="-25000" dirty="0">
+                    <a:latin typeface="Times New Roman" panose="02020603050405020304" pitchFamily="18" charset="0"/>
+                    <a:ea typeface="Calibri" panose="020F0502020204030204" pitchFamily="34" charset="0"/>
+                    <a:cs typeface="Times New Roman" panose="02020603050405020304" pitchFamily="18" charset="0"/>
+                  </a:rPr>
+                  <a:t>Spearman</a:t>
+                </a:r>
+                <a:r>
+                  <a:rPr lang="en-US" sz="1400" dirty="0">
+                    <a:latin typeface="Times New Roman" panose="02020603050405020304" pitchFamily="18" charset="0"/>
+                    <a:ea typeface="Calibri" panose="020F0502020204030204" pitchFamily="34" charset="0"/>
+                    <a:cs typeface="Times New Roman" panose="02020603050405020304" pitchFamily="18" charset="0"/>
+                  </a:rPr>
+                  <a:t>(k,&lt;K</a:t>
+                </a:r>
+                <a:r>
+                  <a:rPr lang="en-US" sz="1400" baseline="-25000" dirty="0">
+                    <a:latin typeface="Times New Roman" panose="02020603050405020304" pitchFamily="18" charset="0"/>
+                    <a:ea typeface="Calibri" panose="020F0502020204030204" pitchFamily="34" charset="0"/>
+                    <a:cs typeface="Times New Roman" panose="02020603050405020304" pitchFamily="18" charset="0"/>
+                  </a:rPr>
+                  <a:t>d</a:t>
+                </a:r>
+                <a:r>
+                  <a:rPr lang="en-US" sz="1400" dirty="0">
+                    <a:latin typeface="Times New Roman" panose="02020603050405020304" pitchFamily="18" charset="0"/>
+                    <a:ea typeface="Calibri" panose="020F0502020204030204" pitchFamily="34" charset="0"/>
+                    <a:cs typeface="Times New Roman" panose="02020603050405020304" pitchFamily="18" charset="0"/>
+                  </a:rPr>
+                  <a:t>&gt;) ≈ </a:t>
+                </a:r>
                 <a:r>
                   <a:rPr lang="en-US" sz="1400" dirty="0">
                     <a:latin typeface="Times New Roman" panose="02020603050405020304" pitchFamily="18" charset="0"/>
                     <a:cs typeface="Times New Roman" panose="02020603050405020304" pitchFamily="18" charset="0"/>
                   </a:rPr>
-                  <a:t>in Gaussian Copula</a:t>
+                  <a:t>-0.47</a:t>
                 </a:r>
               </a:p>
               <a:p>
@@ -4446,7 +4456,6 @@
                 </a:r>
                 <a:r>
                   <a:rPr lang="en-US" sz="1000" dirty="0">
-                    <a:effectLst/>
                     <a:latin typeface="Times New Roman" panose="02020603050405020304" pitchFamily="18" charset="0"/>
                     <a:ea typeface="Calibri" panose="020F0502020204030204" pitchFamily="34" charset="0"/>
                     <a:cs typeface="Times New Roman" panose="02020603050405020304" pitchFamily="18" charset="0"/>
@@ -4455,7 +4464,6 @@
                 </a:r>
                 <a:r>
                   <a:rPr lang="en-US" sz="1000" baseline="-25000" dirty="0">
-                    <a:effectLst/>
                     <a:latin typeface="Times New Roman" panose="02020603050405020304" pitchFamily="18" charset="0"/>
                     <a:ea typeface="Calibri" panose="020F0502020204030204" pitchFamily="34" charset="0"/>
                     <a:cs typeface="Times New Roman" panose="02020603050405020304" pitchFamily="18" charset="0"/>
@@ -4544,7 +4552,6 @@
               <a:p>
                 <a:r>
                   <a:rPr lang="en-US" sz="1000" dirty="0">
-                    <a:effectLst/>
                     <a:latin typeface="Times New Roman" panose="02020603050405020304" pitchFamily="18" charset="0"/>
                     <a:ea typeface="Calibri" panose="020F0502020204030204" pitchFamily="34" charset="0"/>
                   </a:rPr>
@@ -4571,8 +4578,8 @@
             </p:nvSpPr>
             <p:spPr>
               <a:xfrm>
-                <a:off x="14350802" y="7932264"/>
-                <a:ext cx="638316" cy="246221"/>
+                <a:off x="14326757" y="7932264"/>
+                <a:ext cx="686406" cy="248851"/>
               </a:xfrm>
               <a:prstGeom prst="rect">
                 <a:avLst/>
@@ -4587,24 +4594,41 @@
               </a:bodyPr>
               <a:lstStyle/>
               <a:p>
+                <a:pPr algn="ctr">
+                  <a:lnSpc>
+                    <a:spcPct val="107000"/>
+                  </a:lnSpc>
+                  <a:spcAft>
+                    <a:spcPts val="800"/>
+                  </a:spcAft>
+                </a:pPr>
                 <a:r>
                   <a:rPr lang="en-US" sz="1000" dirty="0">
-                    <a:effectLst/>
                     <a:latin typeface="Times New Roman" panose="02020603050405020304" pitchFamily="18" charset="0"/>
                     <a:ea typeface="Calibri" panose="020F0502020204030204" pitchFamily="34" charset="0"/>
+                    <a:cs typeface="Times New Roman" panose="02020603050405020304" pitchFamily="18" charset="0"/>
                   </a:rPr>
                   <a:t>p</a:t>
                 </a:r>
                 <a:r>
                   <a:rPr lang="en-US" sz="1000" baseline="-25000" dirty="0">
-                    <a:effectLst/>
                     <a:latin typeface="Times New Roman" panose="02020603050405020304" pitchFamily="18" charset="0"/>
                     <a:ea typeface="Calibri" panose="020F0502020204030204" pitchFamily="34" charset="0"/>
+                    <a:cs typeface="Times New Roman" panose="02020603050405020304" pitchFamily="18" charset="0"/>
+                  </a:rPr>
+                  <a:t>ij</a:t>
+                </a:r>
+                <a:r>
+                  <a:rPr lang="en-US" sz="1000" baseline="30000" dirty="0">
+                    <a:latin typeface="Times New Roman" panose="02020603050405020304" pitchFamily="18" charset="0"/>
+                    <a:ea typeface="Calibri" panose="020F0502020204030204" pitchFamily="34" charset="0"/>
+                    <a:cs typeface="Times New Roman" panose="02020603050405020304" pitchFamily="18" charset="0"/>
                   </a:rPr>
                   <a:t>conditional</a:t>
                 </a:r>
                 <a:endParaRPr lang="en-US" sz="1000" dirty="0">
-                  <a:latin typeface="Times New Roman" panose="02020603050405020304" pitchFamily="18" charset="0"/>
+                  <a:latin typeface="Calibri" panose="020F0502020204030204" pitchFamily="34" charset="0"/>
+                  <a:ea typeface="Calibri" panose="020F0502020204030204" pitchFamily="34" charset="0"/>
                   <a:cs typeface="Times New Roman" panose="02020603050405020304" pitchFamily="18" charset="0"/>
                 </a:endParaRPr>
               </a:p>
@@ -4665,10 +4689,10 @@
           </p:nvGrpSpPr>
           <p:grpSpPr>
             <a:xfrm>
-              <a:off x="49084" y="8368741"/>
-              <a:ext cx="16361032" cy="3592693"/>
-              <a:chOff x="49084" y="8368741"/>
-              <a:chExt cx="16361032" cy="3592693"/>
+              <a:off x="1291526" y="8368741"/>
+              <a:ext cx="15118590" cy="3592693"/>
+              <a:chOff x="1291526" y="8368741"/>
+              <a:chExt cx="15118590" cy="3592693"/>
             </a:xfrm>
           </p:grpSpPr>
           <p:pic>
@@ -4791,72 +4815,6 @@
               </a:prstGeom>
             </p:spPr>
           </p:pic>
-          <p:sp>
-            <p:nvSpPr>
-              <p:cNvPr id="55" name="TextBox 54">
-                <a:extLst>
-                  <a:ext uri="{FF2B5EF4-FFF2-40B4-BE49-F238E27FC236}">
-                    <a16:creationId xmlns:a16="http://schemas.microsoft.com/office/drawing/2014/main" id="{D6953980-3EBE-4B97-AB59-2868B6C88AD2}"/>
-                  </a:ext>
-                </a:extLst>
-              </p:cNvPr>
-              <p:cNvSpPr txBox="1"/>
-              <p:nvPr/>
-            </p:nvSpPr>
-            <p:spPr>
-              <a:xfrm>
-                <a:off x="49084" y="9400377"/>
-                <a:ext cx="1154546" cy="1600438"/>
-              </a:xfrm>
-              <a:prstGeom prst="rect">
-                <a:avLst/>
-              </a:prstGeom>
-              <a:noFill/>
-            </p:spPr>
-            <p:txBody>
-              <a:bodyPr wrap="square" rtlCol="0">
-                <a:spAutoFit/>
-              </a:bodyPr>
-              <a:lstStyle/>
-              <a:p>
-                <a:pPr algn="ctr"/>
-                <a:r>
-                  <a:rPr lang="en-US" sz="1400" dirty="0">
-                    <a:latin typeface="Times New Roman" panose="02020603050405020304" pitchFamily="18" charset="0"/>
-                    <a:cs typeface="Times New Roman" panose="02020603050405020304" pitchFamily="18" charset="0"/>
-                  </a:rPr>
-                  <a:t>Power-law </a:t>
-                </a:r>
-              </a:p>
-              <a:p>
-                <a:pPr algn="ctr"/>
-                <a:r>
-                  <a:rPr lang="en-US" sz="1400" dirty="0">
-                    <a:latin typeface="Times New Roman" panose="02020603050405020304" pitchFamily="18" charset="0"/>
-                    <a:cs typeface="Times New Roman" panose="02020603050405020304" pitchFamily="18" charset="0"/>
-                  </a:rPr>
-                  <a:t>+</a:t>
-                </a:r>
-              </a:p>
-              <a:p>
-                <a:pPr algn="ctr"/>
-                <a:r>
-                  <a:rPr lang="en-US" sz="1400" dirty="0">
-                    <a:latin typeface="Times New Roman" panose="02020603050405020304" pitchFamily="18" charset="0"/>
-                    <a:cs typeface="Times New Roman" panose="02020603050405020304" pitchFamily="18" charset="0"/>
-                  </a:rPr>
-                  <a:t>No Correlation in Gaussian Copula</a:t>
-                </a:r>
-              </a:p>
-              <a:p>
-                <a:pPr algn="ctr"/>
-                <a:endParaRPr lang="en-US" sz="1400" dirty="0">
-                  <a:latin typeface="Times New Roman" panose="02020603050405020304" pitchFamily="18" charset="0"/>
-                  <a:cs typeface="Times New Roman" panose="02020603050405020304" pitchFamily="18" charset="0"/>
-                </a:endParaRPr>
-              </a:p>
-            </p:txBody>
-          </p:sp>
           <p:sp>
             <p:nvSpPr>
               <p:cNvPr id="76" name="TextBox 75">
@@ -5016,7 +4974,6 @@
                 </a:r>
                 <a:r>
                   <a:rPr lang="en-US" sz="1000" dirty="0">
-                    <a:effectLst/>
                     <a:latin typeface="Times New Roman" panose="02020603050405020304" pitchFamily="18" charset="0"/>
                     <a:ea typeface="Calibri" panose="020F0502020204030204" pitchFamily="34" charset="0"/>
                     <a:cs typeface="Times New Roman" panose="02020603050405020304" pitchFamily="18" charset="0"/>
@@ -5025,7 +4982,6 @@
                 </a:r>
                 <a:r>
                   <a:rPr lang="en-US" sz="1000" baseline="-25000" dirty="0">
-                    <a:effectLst/>
                     <a:latin typeface="Times New Roman" panose="02020603050405020304" pitchFamily="18" charset="0"/>
                     <a:ea typeface="Calibri" panose="020F0502020204030204" pitchFamily="34" charset="0"/>
                     <a:cs typeface="Times New Roman" panose="02020603050405020304" pitchFamily="18" charset="0"/>
@@ -5074,7 +5030,6 @@
               <a:p>
                 <a:r>
                   <a:rPr lang="en-US" sz="1000" dirty="0">
-                    <a:effectLst/>
                     <a:latin typeface="Times New Roman" panose="02020603050405020304" pitchFamily="18" charset="0"/>
                     <a:ea typeface="Calibri" panose="020F0502020204030204" pitchFamily="34" charset="0"/>
                   </a:rPr>
@@ -5141,8 +5096,8 @@
             </p:nvSpPr>
             <p:spPr>
               <a:xfrm>
-                <a:off x="14236015" y="11559857"/>
-                <a:ext cx="638316" cy="246221"/>
+                <a:off x="14211970" y="11559857"/>
+                <a:ext cx="686406" cy="248851"/>
               </a:xfrm>
               <a:prstGeom prst="rect">
                 <a:avLst/>
@@ -5157,24 +5112,41 @@
               </a:bodyPr>
               <a:lstStyle/>
               <a:p>
+                <a:pPr algn="ctr">
+                  <a:lnSpc>
+                    <a:spcPct val="107000"/>
+                  </a:lnSpc>
+                  <a:spcAft>
+                    <a:spcPts val="800"/>
+                  </a:spcAft>
+                </a:pPr>
                 <a:r>
                   <a:rPr lang="en-US" sz="1000" dirty="0">
-                    <a:effectLst/>
                     <a:latin typeface="Times New Roman" panose="02020603050405020304" pitchFamily="18" charset="0"/>
                     <a:ea typeface="Calibri" panose="020F0502020204030204" pitchFamily="34" charset="0"/>
+                    <a:cs typeface="Times New Roman" panose="02020603050405020304" pitchFamily="18" charset="0"/>
                   </a:rPr>
                   <a:t>p</a:t>
                 </a:r>
                 <a:r>
                   <a:rPr lang="en-US" sz="1000" baseline="-25000" dirty="0">
-                    <a:effectLst/>
                     <a:latin typeface="Times New Roman" panose="02020603050405020304" pitchFamily="18" charset="0"/>
                     <a:ea typeface="Calibri" panose="020F0502020204030204" pitchFamily="34" charset="0"/>
+                    <a:cs typeface="Times New Roman" panose="02020603050405020304" pitchFamily="18" charset="0"/>
+                  </a:rPr>
+                  <a:t>ij</a:t>
+                </a:r>
+                <a:r>
+                  <a:rPr lang="en-US" sz="1000" baseline="30000" dirty="0">
+                    <a:latin typeface="Times New Roman" panose="02020603050405020304" pitchFamily="18" charset="0"/>
+                    <a:ea typeface="Calibri" panose="020F0502020204030204" pitchFamily="34" charset="0"/>
+                    <a:cs typeface="Times New Roman" panose="02020603050405020304" pitchFamily="18" charset="0"/>
                   </a:rPr>
                   <a:t>conditional</a:t>
                 </a:r>
                 <a:endParaRPr lang="en-US" sz="1000" dirty="0">
-                  <a:latin typeface="Times New Roman" panose="02020603050405020304" pitchFamily="18" charset="0"/>
+                  <a:latin typeface="Calibri" panose="020F0502020204030204" pitchFamily="34" charset="0"/>
+                  <a:ea typeface="Calibri" panose="020F0502020204030204" pitchFamily="34" charset="0"/>
                   <a:cs typeface="Times New Roman" panose="02020603050405020304" pitchFamily="18" charset="0"/>
                 </a:endParaRPr>
               </a:p>
@@ -5340,7 +5312,6 @@
               </a:r>
               <a:r>
                 <a:rPr lang="en-US" sz="1000" dirty="0">
-                  <a:effectLst/>
                   <a:latin typeface="Times New Roman" panose="02020603050405020304" pitchFamily="18" charset="0"/>
                   <a:ea typeface="Calibri" panose="020F0502020204030204" pitchFamily="34" charset="0"/>
                   <a:cs typeface="Times New Roman" panose="02020603050405020304" pitchFamily="18" charset="0"/>
@@ -5349,7 +5320,6 @@
               </a:r>
               <a:r>
                 <a:rPr lang="en-US" sz="1000" baseline="-25000" dirty="0">
-                  <a:effectLst/>
                   <a:latin typeface="Times New Roman" panose="02020603050405020304" pitchFamily="18" charset="0"/>
                   <a:ea typeface="Calibri" panose="020F0502020204030204" pitchFamily="34" charset="0"/>
                   <a:cs typeface="Times New Roman" panose="02020603050405020304" pitchFamily="18" charset="0"/>
@@ -5478,7 +5448,6 @@
             <a:p>
               <a:r>
                 <a:rPr lang="en-US" sz="1000" dirty="0">
-                  <a:effectLst/>
                   <a:latin typeface="Times New Roman" panose="02020603050405020304" pitchFamily="18" charset="0"/>
                   <a:ea typeface="Calibri" panose="020F0502020204030204" pitchFamily="34" charset="0"/>
                 </a:rPr>
@@ -5505,8 +5474,8 @@
           </p:nvSpPr>
           <p:spPr>
             <a:xfrm>
-              <a:off x="14303482" y="15192973"/>
-              <a:ext cx="638316" cy="246221"/>
+              <a:off x="14279437" y="15192973"/>
+              <a:ext cx="686406" cy="248851"/>
             </a:xfrm>
             <a:prstGeom prst="rect">
               <a:avLst/>
@@ -5521,24 +5490,41 @@
             </a:bodyPr>
             <a:lstStyle/>
             <a:p>
+              <a:pPr algn="ctr">
+                <a:lnSpc>
+                  <a:spcPct val="107000"/>
+                </a:lnSpc>
+                <a:spcAft>
+                  <a:spcPts val="800"/>
+                </a:spcAft>
+              </a:pPr>
               <a:r>
                 <a:rPr lang="en-US" sz="1000" dirty="0">
-                  <a:effectLst/>
                   <a:latin typeface="Times New Roman" panose="02020603050405020304" pitchFamily="18" charset="0"/>
                   <a:ea typeface="Calibri" panose="020F0502020204030204" pitchFamily="34" charset="0"/>
+                  <a:cs typeface="Times New Roman" panose="02020603050405020304" pitchFamily="18" charset="0"/>
                 </a:rPr>
                 <a:t>p</a:t>
               </a:r>
               <a:r>
                 <a:rPr lang="en-US" sz="1000" baseline="-25000" dirty="0">
-                  <a:effectLst/>
                   <a:latin typeface="Times New Roman" panose="02020603050405020304" pitchFamily="18" charset="0"/>
                   <a:ea typeface="Calibri" panose="020F0502020204030204" pitchFamily="34" charset="0"/>
+                  <a:cs typeface="Times New Roman" panose="02020603050405020304" pitchFamily="18" charset="0"/>
+                </a:rPr>
+                <a:t>ij</a:t>
+              </a:r>
+              <a:r>
+                <a:rPr lang="en-US" sz="1000" baseline="30000" dirty="0">
+                  <a:latin typeface="Times New Roman" panose="02020603050405020304" pitchFamily="18" charset="0"/>
+                  <a:ea typeface="Calibri" panose="020F0502020204030204" pitchFamily="34" charset="0"/>
+                  <a:cs typeface="Times New Roman" panose="02020603050405020304" pitchFamily="18" charset="0"/>
                 </a:rPr>
                 <a:t>conditional</a:t>
               </a:r>
               <a:endParaRPr lang="en-US" sz="1000" dirty="0">
-                <a:latin typeface="Times New Roman" panose="02020603050405020304" pitchFamily="18" charset="0"/>
+                <a:latin typeface="Calibri" panose="020F0502020204030204" pitchFamily="34" charset="0"/>
+                <a:ea typeface="Calibri" panose="020F0502020204030204" pitchFamily="34" charset="0"/>
                 <a:cs typeface="Times New Roman" panose="02020603050405020304" pitchFamily="18" charset="0"/>
               </a:endParaRPr>
             </a:p>
@@ -5585,6 +5571,208 @@
           </p:txBody>
         </p:sp>
       </p:grpSp>
+      <p:sp>
+        <p:nvSpPr>
+          <p:cNvPr id="94" name="TextBox 93">
+            <a:extLst>
+              <a:ext uri="{FF2B5EF4-FFF2-40B4-BE49-F238E27FC236}">
+                <a16:creationId xmlns:a16="http://schemas.microsoft.com/office/drawing/2014/main" id="{22A773C9-1B28-4685-875D-0D50F9C4A1E1}"/>
+              </a:ext>
+            </a:extLst>
+          </p:cNvPr>
+          <p:cNvSpPr txBox="1"/>
+          <p:nvPr/>
+        </p:nvSpPr>
+        <p:spPr>
+          <a:xfrm>
+            <a:off x="13161" y="9670534"/>
+            <a:ext cx="2134409" cy="738664"/>
+          </a:xfrm>
+          <a:prstGeom prst="rect">
+            <a:avLst/>
+          </a:prstGeom>
+          <a:noFill/>
+        </p:spPr>
+        <p:txBody>
+          <a:bodyPr wrap="square" rtlCol="0">
+            <a:spAutoFit/>
+          </a:bodyPr>
+          <a:lstStyle/>
+          <a:p>
+            <a:pPr algn="ctr"/>
+            <a:r>
+              <a:rPr lang="en-US" sz="1400" dirty="0">
+                <a:latin typeface="Times New Roman" panose="02020603050405020304" pitchFamily="18" charset="0"/>
+                <a:cs typeface="Times New Roman" panose="02020603050405020304" pitchFamily="18" charset="0"/>
+              </a:rPr>
+              <a:t>Power-law </a:t>
+            </a:r>
+          </a:p>
+          <a:p>
+            <a:pPr algn="ctr"/>
+            <a:r>
+              <a:rPr lang="en-US" sz="1400" dirty="0">
+                <a:latin typeface="Times New Roman" panose="02020603050405020304" pitchFamily="18" charset="0"/>
+                <a:cs typeface="Times New Roman" panose="02020603050405020304" pitchFamily="18" charset="0"/>
+              </a:rPr>
+              <a:t>+</a:t>
+            </a:r>
+          </a:p>
+          <a:p>
+            <a:pPr algn="ctr"/>
+            <a:r>
+              <a:rPr lang="en-US" sz="1400" dirty="0">
+                <a:latin typeface="Times New Roman" panose="02020603050405020304" pitchFamily="18" charset="0"/>
+                <a:ea typeface="Calibri" panose="020F0502020204030204" pitchFamily="34" charset="0"/>
+                <a:cs typeface="Times New Roman" panose="02020603050405020304" pitchFamily="18" charset="0"/>
+              </a:rPr>
+              <a:t>c</a:t>
+            </a:r>
+            <a:r>
+              <a:rPr lang="en-US" sz="1400" baseline="-25000" dirty="0">
+                <a:latin typeface="Times New Roman" panose="02020603050405020304" pitchFamily="18" charset="0"/>
+                <a:ea typeface="Calibri" panose="020F0502020204030204" pitchFamily="34" charset="0"/>
+                <a:cs typeface="Times New Roman" panose="02020603050405020304" pitchFamily="18" charset="0"/>
+              </a:rPr>
+              <a:t>Spearman</a:t>
+            </a:r>
+            <a:r>
+              <a:rPr lang="en-US" sz="1400" dirty="0">
+                <a:latin typeface="Times New Roman" panose="02020603050405020304" pitchFamily="18" charset="0"/>
+                <a:ea typeface="Calibri" panose="020F0502020204030204" pitchFamily="34" charset="0"/>
+                <a:cs typeface="Times New Roman" panose="02020603050405020304" pitchFamily="18" charset="0"/>
+              </a:rPr>
+              <a:t>(k,&lt;K</a:t>
+            </a:r>
+            <a:r>
+              <a:rPr lang="en-US" sz="1400" baseline="-25000" dirty="0">
+                <a:latin typeface="Times New Roman" panose="02020603050405020304" pitchFamily="18" charset="0"/>
+                <a:ea typeface="Calibri" panose="020F0502020204030204" pitchFamily="34" charset="0"/>
+                <a:cs typeface="Times New Roman" panose="02020603050405020304" pitchFamily="18" charset="0"/>
+              </a:rPr>
+              <a:t>d</a:t>
+            </a:r>
+            <a:r>
+              <a:rPr lang="en-US" sz="1400" dirty="0">
+                <a:latin typeface="Times New Roman" panose="02020603050405020304" pitchFamily="18" charset="0"/>
+                <a:ea typeface="Calibri" panose="020F0502020204030204" pitchFamily="34" charset="0"/>
+                <a:cs typeface="Times New Roman" panose="02020603050405020304" pitchFamily="18" charset="0"/>
+              </a:rPr>
+              <a:t>&gt;) ≈ 0</a:t>
+            </a:r>
+            <a:endParaRPr lang="en-US" sz="1400" dirty="0">
+              <a:latin typeface="Times New Roman" panose="02020603050405020304" pitchFamily="18" charset="0"/>
+              <a:cs typeface="Times New Roman" panose="02020603050405020304" pitchFamily="18" charset="0"/>
+            </a:endParaRPr>
+          </a:p>
+        </p:txBody>
+      </p:sp>
+      <p:sp>
+        <p:nvSpPr>
+          <p:cNvPr id="95" name="TextBox 94">
+            <a:extLst>
+              <a:ext uri="{FF2B5EF4-FFF2-40B4-BE49-F238E27FC236}">
+                <a16:creationId xmlns:a16="http://schemas.microsoft.com/office/drawing/2014/main" id="{F352C559-5557-42D6-B9AC-BD75D83B37F5}"/>
+              </a:ext>
+            </a:extLst>
+          </p:cNvPr>
+          <p:cNvSpPr txBox="1"/>
+          <p:nvPr/>
+        </p:nvSpPr>
+        <p:spPr>
+          <a:xfrm>
+            <a:off x="35899" y="13140055"/>
+            <a:ext cx="2281677" cy="954107"/>
+          </a:xfrm>
+          <a:prstGeom prst="rect">
+            <a:avLst/>
+          </a:prstGeom>
+          <a:noFill/>
+        </p:spPr>
+        <p:txBody>
+          <a:bodyPr wrap="square" rtlCol="0">
+            <a:spAutoFit/>
+          </a:bodyPr>
+          <a:lstStyle/>
+          <a:p>
+            <a:pPr algn="ctr"/>
+            <a:r>
+              <a:rPr lang="en-US" sz="1400" dirty="0">
+                <a:latin typeface="Times New Roman" panose="02020603050405020304" pitchFamily="18" charset="0"/>
+                <a:cs typeface="Times New Roman" panose="02020603050405020304" pitchFamily="18" charset="0"/>
+              </a:rPr>
+              <a:t>Power-law </a:t>
+            </a:r>
+          </a:p>
+          <a:p>
+            <a:pPr algn="ctr"/>
+            <a:r>
+              <a:rPr lang="en-US" sz="1400" dirty="0">
+                <a:latin typeface="Times New Roman" panose="02020603050405020304" pitchFamily="18" charset="0"/>
+                <a:cs typeface="Times New Roman" panose="02020603050405020304" pitchFamily="18" charset="0"/>
+              </a:rPr>
+              <a:t>+</a:t>
+            </a:r>
+          </a:p>
+          <a:p>
+            <a:pPr algn="ctr"/>
+            <a:r>
+              <a:rPr lang="en-US" sz="1400" dirty="0">
+                <a:latin typeface="Times New Roman" panose="02020603050405020304" pitchFamily="18" charset="0"/>
+                <a:ea typeface="Calibri" panose="020F0502020204030204" pitchFamily="34" charset="0"/>
+                <a:cs typeface="Times New Roman" panose="02020603050405020304" pitchFamily="18" charset="0"/>
+              </a:rPr>
+              <a:t>c</a:t>
+            </a:r>
+            <a:r>
+              <a:rPr lang="en-US" sz="1400" baseline="-25000" dirty="0">
+                <a:latin typeface="Times New Roman" panose="02020603050405020304" pitchFamily="18" charset="0"/>
+                <a:ea typeface="Calibri" panose="020F0502020204030204" pitchFamily="34" charset="0"/>
+                <a:cs typeface="Times New Roman" panose="02020603050405020304" pitchFamily="18" charset="0"/>
+              </a:rPr>
+              <a:t>Spearman</a:t>
+            </a:r>
+            <a:r>
+              <a:rPr lang="en-US" sz="1400" dirty="0">
+                <a:latin typeface="Times New Roman" panose="02020603050405020304" pitchFamily="18" charset="0"/>
+                <a:ea typeface="Calibri" panose="020F0502020204030204" pitchFamily="34" charset="0"/>
+                <a:cs typeface="Times New Roman" panose="02020603050405020304" pitchFamily="18" charset="0"/>
+              </a:rPr>
+              <a:t>(k,&lt;K</a:t>
+            </a:r>
+            <a:r>
+              <a:rPr lang="en-US" sz="1400" baseline="-25000" dirty="0">
+                <a:latin typeface="Times New Roman" panose="02020603050405020304" pitchFamily="18" charset="0"/>
+                <a:ea typeface="Calibri" panose="020F0502020204030204" pitchFamily="34" charset="0"/>
+                <a:cs typeface="Times New Roman" panose="02020603050405020304" pitchFamily="18" charset="0"/>
+              </a:rPr>
+              <a:t>d</a:t>
+            </a:r>
+            <a:r>
+              <a:rPr lang="en-US" sz="1400" dirty="0">
+                <a:latin typeface="Times New Roman" panose="02020603050405020304" pitchFamily="18" charset="0"/>
+                <a:ea typeface="Calibri" panose="020F0502020204030204" pitchFamily="34" charset="0"/>
+                <a:cs typeface="Times New Roman" panose="02020603050405020304" pitchFamily="18" charset="0"/>
+              </a:rPr>
+              <a:t>&gt;) ≈ </a:t>
+            </a:r>
+            <a:r>
+              <a:rPr lang="en-US" sz="1400" dirty="0">
+                <a:latin typeface="Times New Roman" panose="02020603050405020304" pitchFamily="18" charset="0"/>
+                <a:cs typeface="Times New Roman" panose="02020603050405020304" pitchFamily="18" charset="0"/>
+              </a:rPr>
+              <a:t>-0.47</a:t>
+            </a:r>
+          </a:p>
+          <a:p>
+            <a:pPr algn="ctr"/>
+            <a:endParaRPr lang="en-US" sz="1400" dirty="0">
+              <a:latin typeface="Times New Roman" panose="02020603050405020304" pitchFamily="18" charset="0"/>
+              <a:cs typeface="Times New Roman" panose="02020603050405020304" pitchFamily="18" charset="0"/>
+            </a:endParaRPr>
+          </a:p>
+        </p:txBody>
+      </p:sp>
     </p:spTree>
     <p:extLst>
       <p:ext uri="{BB962C8B-B14F-4D97-AF65-F5344CB8AC3E}">

</xml_diff>